<commit_message>
aggiunto sistema di chiamata "Hey Sofy" per l'attivazione dell'AI durante la conversazione . Aggiunto sistema di terminazione dell'audio se si parla durante un tts in corso . Aggiunto il salvataggio di tuti i parametri della voce.
</commit_message>
<xml_diff>
--- a/PRESENTAZIONE_TECNICA.pptx
+++ b/PRESENTAZIONE_TECNICA.pptx
@@ -5,38 +5,38 @@
     <p:sldMasterId id="2147483648" r:id="rId1"/>
   </p:sldMasterIdLst>
   <p:sldIdLst>
-    <p:sldId id="256" r:id="rId7"/>
-    <p:sldId id="257" r:id="rId8"/>
-    <p:sldId id="258" r:id="rId9"/>
-    <p:sldId id="259" r:id="rId10"/>
-    <p:sldId id="260" r:id="rId11"/>
-    <p:sldId id="261" r:id="rId12"/>
-    <p:sldId id="262" r:id="rId13"/>
-    <p:sldId id="263" r:id="rId14"/>
-    <p:sldId id="264" r:id="rId15"/>
-    <p:sldId id="265" r:id="rId16"/>
-    <p:sldId id="266" r:id="rId17"/>
-    <p:sldId id="267" r:id="rId18"/>
-    <p:sldId id="268" r:id="rId19"/>
-    <p:sldId id="269" r:id="rId20"/>
-    <p:sldId id="270" r:id="rId21"/>
-    <p:sldId id="271" r:id="rId22"/>
-    <p:sldId id="272" r:id="rId23"/>
-    <p:sldId id="273" r:id="rId24"/>
-    <p:sldId id="274" r:id="rId25"/>
-    <p:sldId id="275" r:id="rId26"/>
-    <p:sldId id="276" r:id="rId27"/>
-    <p:sldId id="277" r:id="rId28"/>
-    <p:sldId id="278" r:id="rId29"/>
-    <p:sldId id="279" r:id="rId30"/>
-    <p:sldId id="280" r:id="rId31"/>
-    <p:sldId id="281" r:id="rId32"/>
-    <p:sldId id="282" r:id="rId33"/>
-    <p:sldId id="283" r:id="rId34"/>
-    <p:sldId id="284" r:id="rId35"/>
-    <p:sldId id="285" r:id="rId36"/>
-    <p:sldId id="286" r:id="rId37"/>
-    <p:sldId id="287" r:id="rId38"/>
+    <p:sldId id="256" r:id="rId2"/>
+    <p:sldId id="257" r:id="rId3"/>
+    <p:sldId id="258" r:id="rId4"/>
+    <p:sldId id="259" r:id="rId5"/>
+    <p:sldId id="260" r:id="rId6"/>
+    <p:sldId id="261" r:id="rId7"/>
+    <p:sldId id="262" r:id="rId8"/>
+    <p:sldId id="263" r:id="rId9"/>
+    <p:sldId id="264" r:id="rId10"/>
+    <p:sldId id="265" r:id="rId11"/>
+    <p:sldId id="266" r:id="rId12"/>
+    <p:sldId id="267" r:id="rId13"/>
+    <p:sldId id="268" r:id="rId14"/>
+    <p:sldId id="269" r:id="rId15"/>
+    <p:sldId id="270" r:id="rId16"/>
+    <p:sldId id="271" r:id="rId17"/>
+    <p:sldId id="272" r:id="rId18"/>
+    <p:sldId id="273" r:id="rId19"/>
+    <p:sldId id="274" r:id="rId20"/>
+    <p:sldId id="275" r:id="rId21"/>
+    <p:sldId id="276" r:id="rId22"/>
+    <p:sldId id="277" r:id="rId23"/>
+    <p:sldId id="278" r:id="rId24"/>
+    <p:sldId id="279" r:id="rId25"/>
+    <p:sldId id="280" r:id="rId26"/>
+    <p:sldId id="281" r:id="rId27"/>
+    <p:sldId id="282" r:id="rId28"/>
+    <p:sldId id="283" r:id="rId29"/>
+    <p:sldId id="284" r:id="rId30"/>
+    <p:sldId id="285" r:id="rId31"/>
+    <p:sldId id="286" r:id="rId32"/>
+    <p:sldId id="287" r:id="rId33"/>
   </p:sldIdLst>
   <p:sldSz cx="9144000" cy="6858000" type="screen4x3"/>
   <p:notesSz cx="6858000" cy="9144000"/>
@@ -135,6 +135,22 @@
       </a:defRPr>
     </a:lvl9pPr>
   </p:defaultTextStyle>
+  <p:extLst>
+    <p:ext uri="{EFAFB233-063F-42B5-8137-9DF3F51BA10A}">
+      <p15:sldGuideLst xmlns:p15="http://schemas.microsoft.com/office/powerpoint/2012/main">
+        <p15:guide id="1" orient="horz" pos="2160">
+          <p15:clr>
+            <a:srgbClr val="A4A3A4"/>
+          </p15:clr>
+        </p15:guide>
+        <p15:guide id="2" pos="2880">
+          <p15:clr>
+            <a:srgbClr val="A4A3A4"/>
+          </p15:clr>
+        </p15:guide>
+      </p15:sldGuideLst>
+    </p:ext>
+  </p:extLst>
 </p:presentation>
 </file>
 
@@ -176,10 +192,9 @@
           <a:lstStyle/>
           <a:p>
             <a:r>
-              <a:rPr lang="en-US" smtClean="0"/>
+              <a:rPr lang="en-US"/>
               <a:t>Click to edit Master title style</a:t>
             </a:r>
-            <a:endParaRPr lang="en-US"/>
           </a:p>
         </p:txBody>
       </p:sp>
@@ -295,10 +310,9 @@
           </a:lstStyle>
           <a:p>
             <a:r>
-              <a:rPr lang="en-US" smtClean="0"/>
+              <a:rPr lang="en-US"/>
               <a:t>Click to edit Master subtitle style</a:t>
             </a:r>
-            <a:endParaRPr lang="en-US"/>
           </a:p>
         </p:txBody>
       </p:sp>
@@ -319,7 +333,7 @@
           <a:p>
             <a:fld id="{5BCAD085-E8A6-8845-BD4E-CB4CCA059FC4}" type="datetimeFigureOut">
               <a:rPr lang="en-US" smtClean="0"/>
-              <a:t>1/27/13</a:t>
+              <a:t>1/20/26</a:t>
             </a:fld>
             <a:endParaRPr lang="en-US"/>
           </a:p>
@@ -361,7 +375,7 @@
           <a:p>
             <a:fld id="{C1FF6DA9-008F-8B48-92A6-B652298478BF}" type="slidenum">
               <a:rPr lang="en-US" smtClean="0"/>
-              <a:t>‹#›</a:t>
+              <a:t>‹N›</a:t>
             </a:fld>
             <a:endParaRPr lang="en-US"/>
           </a:p>
@@ -413,10 +427,9 @@
           <a:lstStyle/>
           <a:p>
             <a:r>
-              <a:rPr lang="en-US" smtClean="0"/>
+              <a:rPr lang="en-US"/>
               <a:t>Click to edit Master title style</a:t>
             </a:r>
-            <a:endParaRPr lang="en-US"/>
           </a:p>
         </p:txBody>
       </p:sp>
@@ -437,38 +450,37 @@
           <a:p>
             <a:pPr lvl="0"/>
             <a:r>
-              <a:rPr lang="en-US" smtClean="0"/>
+              <a:rPr lang="en-US"/>
               <a:t>Click to edit Master text styles</a:t>
             </a:r>
           </a:p>
           <a:p>
             <a:pPr lvl="1"/>
             <a:r>
-              <a:rPr lang="en-US" smtClean="0"/>
+              <a:rPr lang="en-US"/>
               <a:t>Second level</a:t>
             </a:r>
           </a:p>
           <a:p>
             <a:pPr lvl="2"/>
             <a:r>
-              <a:rPr lang="en-US" smtClean="0"/>
+              <a:rPr lang="en-US"/>
               <a:t>Third level</a:t>
             </a:r>
           </a:p>
           <a:p>
             <a:pPr lvl="3"/>
             <a:r>
-              <a:rPr lang="en-US" smtClean="0"/>
+              <a:rPr lang="en-US"/>
               <a:t>Fourth level</a:t>
             </a:r>
           </a:p>
           <a:p>
             <a:pPr lvl="4"/>
             <a:r>
-              <a:rPr lang="en-US" smtClean="0"/>
+              <a:rPr lang="en-US"/>
               <a:t>Fifth level</a:t>
             </a:r>
-            <a:endParaRPr lang="en-US"/>
           </a:p>
         </p:txBody>
       </p:sp>
@@ -489,7 +501,7 @@
           <a:p>
             <a:fld id="{5BCAD085-E8A6-8845-BD4E-CB4CCA059FC4}" type="datetimeFigureOut">
               <a:rPr lang="en-US" smtClean="0"/>
-              <a:t>1/27/13</a:t>
+              <a:t>1/20/26</a:t>
             </a:fld>
             <a:endParaRPr lang="en-US"/>
           </a:p>
@@ -531,7 +543,7 @@
           <a:p>
             <a:fld id="{C1FF6DA9-008F-8B48-92A6-B652298478BF}" type="slidenum">
               <a:rPr lang="en-US" smtClean="0"/>
-              <a:t>‹#›</a:t>
+              <a:t>‹N›</a:t>
             </a:fld>
             <a:endParaRPr lang="en-US"/>
           </a:p>
@@ -588,10 +600,9 @@
           <a:lstStyle/>
           <a:p>
             <a:r>
-              <a:rPr lang="en-US" smtClean="0"/>
+              <a:rPr lang="en-US"/>
               <a:t>Click to edit Master title style</a:t>
             </a:r>
-            <a:endParaRPr lang="en-US"/>
           </a:p>
         </p:txBody>
       </p:sp>
@@ -617,38 +628,37 @@
           <a:p>
             <a:pPr lvl="0"/>
             <a:r>
-              <a:rPr lang="en-US" smtClean="0"/>
+              <a:rPr lang="en-US"/>
               <a:t>Click to edit Master text styles</a:t>
             </a:r>
           </a:p>
           <a:p>
             <a:pPr lvl="1"/>
             <a:r>
-              <a:rPr lang="en-US" smtClean="0"/>
+              <a:rPr lang="en-US"/>
               <a:t>Second level</a:t>
             </a:r>
           </a:p>
           <a:p>
             <a:pPr lvl="2"/>
             <a:r>
-              <a:rPr lang="en-US" smtClean="0"/>
+              <a:rPr lang="en-US"/>
               <a:t>Third level</a:t>
             </a:r>
           </a:p>
           <a:p>
             <a:pPr lvl="3"/>
             <a:r>
-              <a:rPr lang="en-US" smtClean="0"/>
+              <a:rPr lang="en-US"/>
               <a:t>Fourth level</a:t>
             </a:r>
           </a:p>
           <a:p>
             <a:pPr lvl="4"/>
             <a:r>
-              <a:rPr lang="en-US" smtClean="0"/>
+              <a:rPr lang="en-US"/>
               <a:t>Fifth level</a:t>
             </a:r>
-            <a:endParaRPr lang="en-US"/>
           </a:p>
         </p:txBody>
       </p:sp>
@@ -669,7 +679,7 @@
           <a:p>
             <a:fld id="{5BCAD085-E8A6-8845-BD4E-CB4CCA059FC4}" type="datetimeFigureOut">
               <a:rPr lang="en-US" smtClean="0"/>
-              <a:t>1/27/13</a:t>
+              <a:t>1/20/26</a:t>
             </a:fld>
             <a:endParaRPr lang="en-US"/>
           </a:p>
@@ -711,7 +721,7 @@
           <a:p>
             <a:fld id="{C1FF6DA9-008F-8B48-92A6-B652298478BF}" type="slidenum">
               <a:rPr lang="en-US" smtClean="0"/>
-              <a:t>‹#›</a:t>
+              <a:t>‹N›</a:t>
             </a:fld>
             <a:endParaRPr lang="en-US"/>
           </a:p>
@@ -763,10 +773,9 @@
           <a:lstStyle/>
           <a:p>
             <a:r>
-              <a:rPr lang="en-US" smtClean="0"/>
+              <a:rPr lang="en-US"/>
               <a:t>Click to edit Master title style</a:t>
             </a:r>
-            <a:endParaRPr lang="en-US"/>
           </a:p>
         </p:txBody>
       </p:sp>
@@ -787,38 +796,37 @@
           <a:p>
             <a:pPr lvl="0"/>
             <a:r>
-              <a:rPr lang="en-US" smtClean="0"/>
+              <a:rPr lang="en-US"/>
               <a:t>Click to edit Master text styles</a:t>
             </a:r>
           </a:p>
           <a:p>
             <a:pPr lvl="1"/>
             <a:r>
-              <a:rPr lang="en-US" smtClean="0"/>
+              <a:rPr lang="en-US"/>
               <a:t>Second level</a:t>
             </a:r>
           </a:p>
           <a:p>
             <a:pPr lvl="2"/>
             <a:r>
-              <a:rPr lang="en-US" smtClean="0"/>
+              <a:rPr lang="en-US"/>
               <a:t>Third level</a:t>
             </a:r>
           </a:p>
           <a:p>
             <a:pPr lvl="3"/>
             <a:r>
-              <a:rPr lang="en-US" smtClean="0"/>
+              <a:rPr lang="en-US"/>
               <a:t>Fourth level</a:t>
             </a:r>
           </a:p>
           <a:p>
             <a:pPr lvl="4"/>
             <a:r>
-              <a:rPr lang="en-US" smtClean="0"/>
+              <a:rPr lang="en-US"/>
               <a:t>Fifth level</a:t>
             </a:r>
-            <a:endParaRPr lang="en-US"/>
           </a:p>
         </p:txBody>
       </p:sp>
@@ -839,7 +847,7 @@
           <a:p>
             <a:fld id="{5BCAD085-E8A6-8845-BD4E-CB4CCA059FC4}" type="datetimeFigureOut">
               <a:rPr lang="en-US" smtClean="0"/>
-              <a:t>1/27/13</a:t>
+              <a:t>1/20/26</a:t>
             </a:fld>
             <a:endParaRPr lang="en-US"/>
           </a:p>
@@ -881,7 +889,7 @@
           <a:p>
             <a:fld id="{C1FF6DA9-008F-8B48-92A6-B652298478BF}" type="slidenum">
               <a:rPr lang="en-US" smtClean="0"/>
-              <a:t>‹#›</a:t>
+              <a:t>‹N›</a:t>
             </a:fld>
             <a:endParaRPr lang="en-US"/>
           </a:p>
@@ -942,10 +950,9 @@
           </a:lstStyle>
           <a:p>
             <a:r>
-              <a:rPr lang="en-US" smtClean="0"/>
+              <a:rPr lang="en-US"/>
               <a:t>Click to edit Master title style</a:t>
             </a:r>
-            <a:endParaRPr lang="en-US"/>
           </a:p>
         </p:txBody>
       </p:sp>
@@ -1062,7 +1069,7 @@
           <a:p>
             <a:pPr lvl="0"/>
             <a:r>
-              <a:rPr lang="en-US" smtClean="0"/>
+              <a:rPr lang="en-US"/>
               <a:t>Click to edit Master text styles</a:t>
             </a:r>
           </a:p>
@@ -1085,7 +1092,7 @@
           <a:p>
             <a:fld id="{5BCAD085-E8A6-8845-BD4E-CB4CCA059FC4}" type="datetimeFigureOut">
               <a:rPr lang="en-US" smtClean="0"/>
-              <a:t>1/27/13</a:t>
+              <a:t>1/20/26</a:t>
             </a:fld>
             <a:endParaRPr lang="en-US"/>
           </a:p>
@@ -1127,7 +1134,7 @@
           <a:p>
             <a:fld id="{C1FF6DA9-008F-8B48-92A6-B652298478BF}" type="slidenum">
               <a:rPr lang="en-US" smtClean="0"/>
-              <a:t>‹#›</a:t>
+              <a:t>‹N›</a:t>
             </a:fld>
             <a:endParaRPr lang="en-US"/>
           </a:p>
@@ -1179,10 +1186,9 @@
           <a:lstStyle/>
           <a:p>
             <a:r>
-              <a:rPr lang="en-US" smtClean="0"/>
+              <a:rPr lang="en-US"/>
               <a:t>Click to edit Master title style</a:t>
             </a:r>
-            <a:endParaRPr lang="en-US"/>
           </a:p>
         </p:txBody>
       </p:sp>
@@ -1236,38 +1242,37 @@
           <a:p>
             <a:pPr lvl="0"/>
             <a:r>
-              <a:rPr lang="en-US" smtClean="0"/>
+              <a:rPr lang="en-US"/>
               <a:t>Click to edit Master text styles</a:t>
             </a:r>
           </a:p>
           <a:p>
             <a:pPr lvl="1"/>
             <a:r>
-              <a:rPr lang="en-US" smtClean="0"/>
+              <a:rPr lang="en-US"/>
               <a:t>Second level</a:t>
             </a:r>
           </a:p>
           <a:p>
             <a:pPr lvl="2"/>
             <a:r>
-              <a:rPr lang="en-US" smtClean="0"/>
+              <a:rPr lang="en-US"/>
               <a:t>Third level</a:t>
             </a:r>
           </a:p>
           <a:p>
             <a:pPr lvl="3"/>
             <a:r>
-              <a:rPr lang="en-US" smtClean="0"/>
+              <a:rPr lang="en-US"/>
               <a:t>Fourth level</a:t>
             </a:r>
           </a:p>
           <a:p>
             <a:pPr lvl="4"/>
             <a:r>
-              <a:rPr lang="en-US" smtClean="0"/>
+              <a:rPr lang="en-US"/>
               <a:t>Fifth level</a:t>
             </a:r>
-            <a:endParaRPr lang="en-US"/>
           </a:p>
         </p:txBody>
       </p:sp>
@@ -1321,38 +1326,37 @@
           <a:p>
             <a:pPr lvl="0"/>
             <a:r>
-              <a:rPr lang="en-US" smtClean="0"/>
+              <a:rPr lang="en-US"/>
               <a:t>Click to edit Master text styles</a:t>
             </a:r>
           </a:p>
           <a:p>
             <a:pPr lvl="1"/>
             <a:r>
-              <a:rPr lang="en-US" smtClean="0"/>
+              <a:rPr lang="en-US"/>
               <a:t>Second level</a:t>
             </a:r>
           </a:p>
           <a:p>
             <a:pPr lvl="2"/>
             <a:r>
-              <a:rPr lang="en-US" smtClean="0"/>
+              <a:rPr lang="en-US"/>
               <a:t>Third level</a:t>
             </a:r>
           </a:p>
           <a:p>
             <a:pPr lvl="3"/>
             <a:r>
-              <a:rPr lang="en-US" smtClean="0"/>
+              <a:rPr lang="en-US"/>
               <a:t>Fourth level</a:t>
             </a:r>
           </a:p>
           <a:p>
             <a:pPr lvl="4"/>
             <a:r>
-              <a:rPr lang="en-US" smtClean="0"/>
+              <a:rPr lang="en-US"/>
               <a:t>Fifth level</a:t>
             </a:r>
-            <a:endParaRPr lang="en-US"/>
           </a:p>
         </p:txBody>
       </p:sp>
@@ -1373,7 +1377,7 @@
           <a:p>
             <a:fld id="{5BCAD085-E8A6-8845-BD4E-CB4CCA059FC4}" type="datetimeFigureOut">
               <a:rPr lang="en-US" smtClean="0"/>
-              <a:t>1/27/13</a:t>
+              <a:t>1/20/26</a:t>
             </a:fld>
             <a:endParaRPr lang="en-US"/>
           </a:p>
@@ -1415,7 +1419,7 @@
           <a:p>
             <a:fld id="{C1FF6DA9-008F-8B48-92A6-B652298478BF}" type="slidenum">
               <a:rPr lang="en-US" smtClean="0"/>
-              <a:t>‹#›</a:t>
+              <a:t>‹N›</a:t>
             </a:fld>
             <a:endParaRPr lang="en-US"/>
           </a:p>
@@ -1471,10 +1475,9 @@
           </a:lstStyle>
           <a:p>
             <a:r>
-              <a:rPr lang="en-US" smtClean="0"/>
+              <a:rPr lang="en-US"/>
               <a:t>Click to edit Master title style</a:t>
             </a:r>
-            <a:endParaRPr lang="en-US"/>
           </a:p>
         </p:txBody>
       </p:sp>
@@ -1537,7 +1540,7 @@
           <a:p>
             <a:pPr lvl="0"/>
             <a:r>
-              <a:rPr lang="en-US" smtClean="0"/>
+              <a:rPr lang="en-US"/>
               <a:t>Click to edit Master text styles</a:t>
             </a:r>
           </a:p>
@@ -1593,38 +1596,37 @@
           <a:p>
             <a:pPr lvl="0"/>
             <a:r>
-              <a:rPr lang="en-US" smtClean="0"/>
+              <a:rPr lang="en-US"/>
               <a:t>Click to edit Master text styles</a:t>
             </a:r>
           </a:p>
           <a:p>
             <a:pPr lvl="1"/>
             <a:r>
-              <a:rPr lang="en-US" smtClean="0"/>
+              <a:rPr lang="en-US"/>
               <a:t>Second level</a:t>
             </a:r>
           </a:p>
           <a:p>
             <a:pPr lvl="2"/>
             <a:r>
-              <a:rPr lang="en-US" smtClean="0"/>
+              <a:rPr lang="en-US"/>
               <a:t>Third level</a:t>
             </a:r>
           </a:p>
           <a:p>
             <a:pPr lvl="3"/>
             <a:r>
-              <a:rPr lang="en-US" smtClean="0"/>
+              <a:rPr lang="en-US"/>
               <a:t>Fourth level</a:t>
             </a:r>
           </a:p>
           <a:p>
             <a:pPr lvl="4"/>
             <a:r>
-              <a:rPr lang="en-US" smtClean="0"/>
+              <a:rPr lang="en-US"/>
               <a:t>Fifth level</a:t>
             </a:r>
-            <a:endParaRPr lang="en-US"/>
           </a:p>
         </p:txBody>
       </p:sp>
@@ -1687,7 +1689,7 @@
           <a:p>
             <a:pPr lvl="0"/>
             <a:r>
-              <a:rPr lang="en-US" smtClean="0"/>
+              <a:rPr lang="en-US"/>
               <a:t>Click to edit Master text styles</a:t>
             </a:r>
           </a:p>
@@ -1743,38 +1745,37 @@
           <a:p>
             <a:pPr lvl="0"/>
             <a:r>
-              <a:rPr lang="en-US" smtClean="0"/>
+              <a:rPr lang="en-US"/>
               <a:t>Click to edit Master text styles</a:t>
             </a:r>
           </a:p>
           <a:p>
             <a:pPr lvl="1"/>
             <a:r>
-              <a:rPr lang="en-US" smtClean="0"/>
+              <a:rPr lang="en-US"/>
               <a:t>Second level</a:t>
             </a:r>
           </a:p>
           <a:p>
             <a:pPr lvl="2"/>
             <a:r>
-              <a:rPr lang="en-US" smtClean="0"/>
+              <a:rPr lang="en-US"/>
               <a:t>Third level</a:t>
             </a:r>
           </a:p>
           <a:p>
             <a:pPr lvl="3"/>
             <a:r>
-              <a:rPr lang="en-US" smtClean="0"/>
+              <a:rPr lang="en-US"/>
               <a:t>Fourth level</a:t>
             </a:r>
           </a:p>
           <a:p>
             <a:pPr lvl="4"/>
             <a:r>
-              <a:rPr lang="en-US" smtClean="0"/>
+              <a:rPr lang="en-US"/>
               <a:t>Fifth level</a:t>
             </a:r>
-            <a:endParaRPr lang="en-US"/>
           </a:p>
         </p:txBody>
       </p:sp>
@@ -1795,7 +1796,7 @@
           <a:p>
             <a:fld id="{5BCAD085-E8A6-8845-BD4E-CB4CCA059FC4}" type="datetimeFigureOut">
               <a:rPr lang="en-US" smtClean="0"/>
-              <a:t>1/27/13</a:t>
+              <a:t>1/20/26</a:t>
             </a:fld>
             <a:endParaRPr lang="en-US"/>
           </a:p>
@@ -1837,7 +1838,7 @@
           <a:p>
             <a:fld id="{C1FF6DA9-008F-8B48-92A6-B652298478BF}" type="slidenum">
               <a:rPr lang="en-US" smtClean="0"/>
-              <a:t>‹#›</a:t>
+              <a:t>‹N›</a:t>
             </a:fld>
             <a:endParaRPr lang="en-US"/>
           </a:p>
@@ -1889,10 +1890,9 @@
           <a:lstStyle/>
           <a:p>
             <a:r>
-              <a:rPr lang="en-US" smtClean="0"/>
+              <a:rPr lang="en-US"/>
               <a:t>Click to edit Master title style</a:t>
             </a:r>
-            <a:endParaRPr lang="en-US"/>
           </a:p>
         </p:txBody>
       </p:sp>
@@ -1913,7 +1913,7 @@
           <a:p>
             <a:fld id="{5BCAD085-E8A6-8845-BD4E-CB4CCA059FC4}" type="datetimeFigureOut">
               <a:rPr lang="en-US" smtClean="0"/>
-              <a:t>1/27/13</a:t>
+              <a:t>1/20/26</a:t>
             </a:fld>
             <a:endParaRPr lang="en-US"/>
           </a:p>
@@ -1955,7 +1955,7 @@
           <a:p>
             <a:fld id="{C1FF6DA9-008F-8B48-92A6-B652298478BF}" type="slidenum">
               <a:rPr lang="en-US" smtClean="0"/>
-              <a:t>‹#›</a:t>
+              <a:t>‹N›</a:t>
             </a:fld>
             <a:endParaRPr lang="en-US"/>
           </a:p>
@@ -2008,7 +2008,7 @@
           <a:p>
             <a:fld id="{5BCAD085-E8A6-8845-BD4E-CB4CCA059FC4}" type="datetimeFigureOut">
               <a:rPr lang="en-US" smtClean="0"/>
-              <a:t>1/27/13</a:t>
+              <a:t>1/20/26</a:t>
             </a:fld>
             <a:endParaRPr lang="en-US"/>
           </a:p>
@@ -2050,7 +2050,7 @@
           <a:p>
             <a:fld id="{C1FF6DA9-008F-8B48-92A6-B652298478BF}" type="slidenum">
               <a:rPr lang="en-US" smtClean="0"/>
-              <a:t>‹#›</a:t>
+              <a:t>‹N›</a:t>
             </a:fld>
             <a:endParaRPr lang="en-US"/>
           </a:p>
@@ -2111,10 +2111,9 @@
           </a:lstStyle>
           <a:p>
             <a:r>
-              <a:rPr lang="en-US" smtClean="0"/>
+              <a:rPr lang="en-US"/>
               <a:t>Click to edit Master title style</a:t>
             </a:r>
-            <a:endParaRPr lang="en-US"/>
           </a:p>
         </p:txBody>
       </p:sp>
@@ -2168,38 +2167,37 @@
           <a:p>
             <a:pPr lvl="0"/>
             <a:r>
-              <a:rPr lang="en-US" smtClean="0"/>
+              <a:rPr lang="en-US"/>
               <a:t>Click to edit Master text styles</a:t>
             </a:r>
           </a:p>
           <a:p>
             <a:pPr lvl="1"/>
             <a:r>
-              <a:rPr lang="en-US" smtClean="0"/>
+              <a:rPr lang="en-US"/>
               <a:t>Second level</a:t>
             </a:r>
           </a:p>
           <a:p>
             <a:pPr lvl="2"/>
             <a:r>
-              <a:rPr lang="en-US" smtClean="0"/>
+              <a:rPr lang="en-US"/>
               <a:t>Third level</a:t>
             </a:r>
           </a:p>
           <a:p>
             <a:pPr lvl="3"/>
             <a:r>
-              <a:rPr lang="en-US" smtClean="0"/>
+              <a:rPr lang="en-US"/>
               <a:t>Fourth level</a:t>
             </a:r>
           </a:p>
           <a:p>
             <a:pPr lvl="4"/>
             <a:r>
-              <a:rPr lang="en-US" smtClean="0"/>
+              <a:rPr lang="en-US"/>
               <a:t>Fifth level</a:t>
             </a:r>
-            <a:endParaRPr lang="en-US"/>
           </a:p>
         </p:txBody>
       </p:sp>
@@ -2262,7 +2260,7 @@
           <a:p>
             <a:pPr lvl="0"/>
             <a:r>
-              <a:rPr lang="en-US" smtClean="0"/>
+              <a:rPr lang="en-US"/>
               <a:t>Click to edit Master text styles</a:t>
             </a:r>
           </a:p>
@@ -2285,7 +2283,7 @@
           <a:p>
             <a:fld id="{5BCAD085-E8A6-8845-BD4E-CB4CCA059FC4}" type="datetimeFigureOut">
               <a:rPr lang="en-US" smtClean="0"/>
-              <a:t>1/27/13</a:t>
+              <a:t>1/20/26</a:t>
             </a:fld>
             <a:endParaRPr lang="en-US"/>
           </a:p>
@@ -2327,7 +2325,7 @@
           <a:p>
             <a:fld id="{C1FF6DA9-008F-8B48-92A6-B652298478BF}" type="slidenum">
               <a:rPr lang="en-US" smtClean="0"/>
-              <a:t>‹#›</a:t>
+              <a:t>‹N›</a:t>
             </a:fld>
             <a:endParaRPr lang="en-US"/>
           </a:p>
@@ -2388,10 +2386,9 @@
           </a:lstStyle>
           <a:p>
             <a:r>
-              <a:rPr lang="en-US" smtClean="0"/>
+              <a:rPr lang="en-US"/>
               <a:t>Click to edit Master title style</a:t>
             </a:r>
-            <a:endParaRPr lang="en-US"/>
           </a:p>
         </p:txBody>
       </p:sp>
@@ -2515,7 +2512,7 @@
           <a:p>
             <a:pPr lvl="0"/>
             <a:r>
-              <a:rPr lang="en-US" smtClean="0"/>
+              <a:rPr lang="en-US"/>
               <a:t>Click to edit Master text styles</a:t>
             </a:r>
           </a:p>
@@ -2538,7 +2535,7 @@
           <a:p>
             <a:fld id="{5BCAD085-E8A6-8845-BD4E-CB4CCA059FC4}" type="datetimeFigureOut">
               <a:rPr lang="en-US" smtClean="0"/>
-              <a:t>1/27/13</a:t>
+              <a:t>1/20/26</a:t>
             </a:fld>
             <a:endParaRPr lang="en-US"/>
           </a:p>
@@ -2580,7 +2577,7 @@
           <a:p>
             <a:fld id="{C1FF6DA9-008F-8B48-92A6-B652298478BF}" type="slidenum">
               <a:rPr lang="en-US" smtClean="0"/>
-              <a:t>‹#›</a:t>
+              <a:t>‹N›</a:t>
             </a:fld>
             <a:endParaRPr lang="en-US"/>
           </a:p>
@@ -2647,10 +2644,9 @@
           <a:lstStyle/>
           <a:p>
             <a:r>
-              <a:rPr lang="en-US" smtClean="0"/>
+              <a:rPr lang="en-US"/>
               <a:t>Click to edit Master title style</a:t>
             </a:r>
-            <a:endParaRPr lang="en-US"/>
           </a:p>
         </p:txBody>
       </p:sp>
@@ -2681,38 +2677,37 @@
           <a:p>
             <a:pPr lvl="0"/>
             <a:r>
-              <a:rPr lang="en-US" smtClean="0"/>
+              <a:rPr lang="en-US"/>
               <a:t>Click to edit Master text styles</a:t>
             </a:r>
           </a:p>
           <a:p>
             <a:pPr lvl="1"/>
             <a:r>
-              <a:rPr lang="en-US" smtClean="0"/>
+              <a:rPr lang="en-US"/>
               <a:t>Second level</a:t>
             </a:r>
           </a:p>
           <a:p>
             <a:pPr lvl="2"/>
             <a:r>
-              <a:rPr lang="en-US" smtClean="0"/>
+              <a:rPr lang="en-US"/>
               <a:t>Third level</a:t>
             </a:r>
           </a:p>
           <a:p>
             <a:pPr lvl="3"/>
             <a:r>
-              <a:rPr lang="en-US" smtClean="0"/>
+              <a:rPr lang="en-US"/>
               <a:t>Fourth level</a:t>
             </a:r>
           </a:p>
           <a:p>
             <a:pPr lvl="4"/>
             <a:r>
-              <a:rPr lang="en-US" smtClean="0"/>
+              <a:rPr lang="en-US"/>
               <a:t>Fifth level</a:t>
             </a:r>
-            <a:endParaRPr lang="en-US"/>
           </a:p>
         </p:txBody>
       </p:sp>
@@ -2751,7 +2746,7 @@
           <a:p>
             <a:fld id="{5BCAD085-E8A6-8845-BD4E-CB4CCA059FC4}" type="datetimeFigureOut">
               <a:rPr lang="en-US" smtClean="0"/>
-              <a:t>1/27/13</a:t>
+              <a:t>1/20/26</a:t>
             </a:fld>
             <a:endParaRPr lang="en-US"/>
           </a:p>
@@ -2829,7 +2824,7 @@
           <a:p>
             <a:fld id="{C1FF6DA9-008F-8B48-92A6-B652298478BF}" type="slidenum">
               <a:rPr lang="en-US" smtClean="0"/>
-              <a:t>‹#›</a:t>
+              <a:t>‹N›</a:t>
             </a:fld>
             <a:endParaRPr lang="en-US"/>
           </a:p>
@@ -3110,7 +3105,7 @@
 </file>
 
 <file path=ppt/slides/slide1.xml><?xml version="1.0" encoding="utf-8"?>
-<p:sld xmlns:a="http://schemas.openxmlformats.org/drawingml/2006/main" xmlns:p="http://schemas.openxmlformats.org/presentationml/2006/main" xmlns:r="http://schemas.openxmlformats.org/officeDocument/2006/relationships">
+<p:sld xmlns:a="http://schemas.openxmlformats.org/drawingml/2006/main" xmlns:r="http://schemas.openxmlformats.org/officeDocument/2006/relationships" xmlns:p="http://schemas.openxmlformats.org/presentationml/2006/main">
   <p:cSld>
     <p:spTree>
       <p:nvGrpSpPr>
@@ -3118,7 +3113,14 @@
         <p:cNvGrpSpPr/>
         <p:nvPr/>
       </p:nvGrpSpPr>
-      <p:grpSpPr/>
+      <p:grpSpPr>
+        <a:xfrm>
+          <a:off x="0" y="0"/>
+          <a:ext cx="0" cy="0"/>
+          <a:chOff x="0" y="0"/>
+          <a:chExt cx="0" cy="0"/>
+        </a:xfrm>
+      </p:grpSpPr>
       <p:sp>
         <p:nvSpPr>
           <p:cNvPr id="2" name="Title 1"/>
@@ -3170,7 +3172,7 @@
 </file>
 
 <file path=ppt/slides/slide10.xml><?xml version="1.0" encoding="utf-8"?>
-<p:sld xmlns:a="http://schemas.openxmlformats.org/drawingml/2006/main" xmlns:p="http://schemas.openxmlformats.org/presentationml/2006/main" xmlns:r="http://schemas.openxmlformats.org/officeDocument/2006/relationships">
+<p:sld xmlns:a="http://schemas.openxmlformats.org/drawingml/2006/main" xmlns:r="http://schemas.openxmlformats.org/officeDocument/2006/relationships" xmlns:p="http://schemas.openxmlformats.org/presentationml/2006/main">
   <p:cSld>
     <p:spTree>
       <p:nvGrpSpPr>
@@ -3178,7 +3180,14 @@
         <p:cNvGrpSpPr/>
         <p:nvPr/>
       </p:nvGrpSpPr>
-      <p:grpSpPr/>
+      <p:grpSpPr>
+        <a:xfrm>
+          <a:off x="0" y="0"/>
+          <a:ext cx="0" cy="0"/>
+          <a:chOff x="0" y="0"/>
+          <a:chExt cx="0" cy="0"/>
+        </a:xfrm>
+      </p:grpSpPr>
       <p:sp>
         <p:nvSpPr>
           <p:cNvPr id="2" name="Title 1"/>
@@ -3214,7 +3223,9 @@
         <p:txBody>
           <a:bodyPr wrap="square"/>
           <a:lstStyle/>
-          <a:p/>
+          <a:p>
+            <a:endParaRPr/>
+          </a:p>
           <a:p>
             <a:pPr>
               <a:spcAft>
@@ -3261,7 +3272,7 @@
 </file>
 
 <file path=ppt/slides/slide11.xml><?xml version="1.0" encoding="utf-8"?>
-<p:sld xmlns:a="http://schemas.openxmlformats.org/drawingml/2006/main" xmlns:p="http://schemas.openxmlformats.org/presentationml/2006/main" xmlns:r="http://schemas.openxmlformats.org/officeDocument/2006/relationships">
+<p:sld xmlns:a="http://schemas.openxmlformats.org/drawingml/2006/main" xmlns:r="http://schemas.openxmlformats.org/officeDocument/2006/relationships" xmlns:p="http://schemas.openxmlformats.org/presentationml/2006/main">
   <p:cSld>
     <p:spTree>
       <p:nvGrpSpPr>
@@ -3269,7 +3280,14 @@
         <p:cNvGrpSpPr/>
         <p:nvPr/>
       </p:nvGrpSpPr>
-      <p:grpSpPr/>
+      <p:grpSpPr>
+        <a:xfrm>
+          <a:off x="0" y="0"/>
+          <a:ext cx="0" cy="0"/>
+          <a:chOff x="0" y="0"/>
+          <a:chExt cx="0" cy="0"/>
+        </a:xfrm>
+      </p:grpSpPr>
       <p:sp>
         <p:nvSpPr>
           <p:cNvPr id="2" name="Title 1"/>
@@ -3305,7 +3323,9 @@
         <p:txBody>
           <a:bodyPr wrap="square"/>
           <a:lstStyle/>
-          <a:p/>
+          <a:p>
+            <a:endParaRPr/>
+          </a:p>
           <a:p>
             <a:pPr>
               <a:spcAft>
@@ -3352,7 +3372,7 @@
 </file>
 
 <file path=ppt/slides/slide12.xml><?xml version="1.0" encoding="utf-8"?>
-<p:sld xmlns:a="http://schemas.openxmlformats.org/drawingml/2006/main" xmlns:p="http://schemas.openxmlformats.org/presentationml/2006/main" xmlns:r="http://schemas.openxmlformats.org/officeDocument/2006/relationships">
+<p:sld xmlns:a="http://schemas.openxmlformats.org/drawingml/2006/main" xmlns:r="http://schemas.openxmlformats.org/officeDocument/2006/relationships" xmlns:p="http://schemas.openxmlformats.org/presentationml/2006/main">
   <p:cSld>
     <p:spTree>
       <p:nvGrpSpPr>
@@ -3360,7 +3380,14 @@
         <p:cNvGrpSpPr/>
         <p:nvPr/>
       </p:nvGrpSpPr>
-      <p:grpSpPr/>
+      <p:grpSpPr>
+        <a:xfrm>
+          <a:off x="0" y="0"/>
+          <a:ext cx="0" cy="0"/>
+          <a:chOff x="0" y="0"/>
+          <a:chExt cx="0" cy="0"/>
+        </a:xfrm>
+      </p:grpSpPr>
       <p:sp>
         <p:nvSpPr>
           <p:cNvPr id="2" name="Title 1"/>
@@ -3396,7 +3423,9 @@
         <p:txBody>
           <a:bodyPr wrap="square"/>
           <a:lstStyle/>
-          <a:p/>
+          <a:p>
+            <a:endParaRPr/>
+          </a:p>
           <a:p>
             <a:pPr>
               <a:spcAft>
@@ -3419,7 +3448,7 @@
 </file>
 
 <file path=ppt/slides/slide13.xml><?xml version="1.0" encoding="utf-8"?>
-<p:sld xmlns:a="http://schemas.openxmlformats.org/drawingml/2006/main" xmlns:p="http://schemas.openxmlformats.org/presentationml/2006/main" xmlns:r="http://schemas.openxmlformats.org/officeDocument/2006/relationships">
+<p:sld xmlns:a="http://schemas.openxmlformats.org/drawingml/2006/main" xmlns:r="http://schemas.openxmlformats.org/officeDocument/2006/relationships" xmlns:p="http://schemas.openxmlformats.org/presentationml/2006/main">
   <p:cSld>
     <p:spTree>
       <p:nvGrpSpPr>
@@ -3427,7 +3456,14 @@
         <p:cNvGrpSpPr/>
         <p:nvPr/>
       </p:nvGrpSpPr>
-      <p:grpSpPr/>
+      <p:grpSpPr>
+        <a:xfrm>
+          <a:off x="0" y="0"/>
+          <a:ext cx="0" cy="0"/>
+          <a:chOff x="0" y="0"/>
+          <a:chExt cx="0" cy="0"/>
+        </a:xfrm>
+      </p:grpSpPr>
       <p:sp>
         <p:nvSpPr>
           <p:cNvPr id="2" name="Title 1"/>
@@ -3463,7 +3499,9 @@
         <p:txBody>
           <a:bodyPr wrap="square"/>
           <a:lstStyle/>
-          <a:p/>
+          <a:p>
+            <a:endParaRPr/>
+          </a:p>
           <a:p>
             <a:pPr>
               <a:spcAft>
@@ -3533,7 +3571,7 @@
 </file>
 
 <file path=ppt/slides/slide14.xml><?xml version="1.0" encoding="utf-8"?>
-<p:sld xmlns:a="http://schemas.openxmlformats.org/drawingml/2006/main" xmlns:p="http://schemas.openxmlformats.org/presentationml/2006/main" xmlns:r="http://schemas.openxmlformats.org/officeDocument/2006/relationships">
+<p:sld xmlns:a="http://schemas.openxmlformats.org/drawingml/2006/main" xmlns:r="http://schemas.openxmlformats.org/officeDocument/2006/relationships" xmlns:p="http://schemas.openxmlformats.org/presentationml/2006/main">
   <p:cSld>
     <p:spTree>
       <p:nvGrpSpPr>
@@ -3541,7 +3579,14 @@
         <p:cNvGrpSpPr/>
         <p:nvPr/>
       </p:nvGrpSpPr>
-      <p:grpSpPr/>
+      <p:grpSpPr>
+        <a:xfrm>
+          <a:off x="0" y="0"/>
+          <a:ext cx="0" cy="0"/>
+          <a:chOff x="0" y="0"/>
+          <a:chExt cx="0" cy="0"/>
+        </a:xfrm>
+      </p:grpSpPr>
       <p:sp>
         <p:nvSpPr>
           <p:cNvPr id="2" name="Title 1"/>
@@ -3577,7 +3622,9 @@
         <p:txBody>
           <a:bodyPr wrap="square"/>
           <a:lstStyle/>
-          <a:p/>
+          <a:p>
+            <a:endParaRPr/>
+          </a:p>
           <a:p>
             <a:pPr>
               <a:spcAft>
@@ -3624,7 +3671,7 @@
 </file>
 
 <file path=ppt/slides/slide15.xml><?xml version="1.0" encoding="utf-8"?>
-<p:sld xmlns:a="http://schemas.openxmlformats.org/drawingml/2006/main" xmlns:p="http://schemas.openxmlformats.org/presentationml/2006/main" xmlns:r="http://schemas.openxmlformats.org/officeDocument/2006/relationships">
+<p:sld xmlns:a="http://schemas.openxmlformats.org/drawingml/2006/main" xmlns:r="http://schemas.openxmlformats.org/officeDocument/2006/relationships" xmlns:p="http://schemas.openxmlformats.org/presentationml/2006/main">
   <p:cSld>
     <p:spTree>
       <p:nvGrpSpPr>
@@ -3632,7 +3679,14 @@
         <p:cNvGrpSpPr/>
         <p:nvPr/>
       </p:nvGrpSpPr>
-      <p:grpSpPr/>
+      <p:grpSpPr>
+        <a:xfrm>
+          <a:off x="0" y="0"/>
+          <a:ext cx="0" cy="0"/>
+          <a:chOff x="0" y="0"/>
+          <a:chExt cx="0" cy="0"/>
+        </a:xfrm>
+      </p:grpSpPr>
       <p:sp>
         <p:nvSpPr>
           <p:cNvPr id="2" name="Title 1"/>
@@ -3668,7 +3722,9 @@
         <p:txBody>
           <a:bodyPr wrap="square"/>
           <a:lstStyle/>
-          <a:p/>
+          <a:p>
+            <a:endParaRPr/>
+          </a:p>
           <a:p>
             <a:pPr>
               <a:spcAft>
@@ -3691,7 +3747,7 @@
 </file>
 
 <file path=ppt/slides/slide16.xml><?xml version="1.0" encoding="utf-8"?>
-<p:sld xmlns:a="http://schemas.openxmlformats.org/drawingml/2006/main" xmlns:p="http://schemas.openxmlformats.org/presentationml/2006/main" xmlns:r="http://schemas.openxmlformats.org/officeDocument/2006/relationships">
+<p:sld xmlns:a="http://schemas.openxmlformats.org/drawingml/2006/main" xmlns:r="http://schemas.openxmlformats.org/officeDocument/2006/relationships" xmlns:p="http://schemas.openxmlformats.org/presentationml/2006/main">
   <p:cSld>
     <p:spTree>
       <p:nvGrpSpPr>
@@ -3699,7 +3755,14 @@
         <p:cNvGrpSpPr/>
         <p:nvPr/>
       </p:nvGrpSpPr>
-      <p:grpSpPr/>
+      <p:grpSpPr>
+        <a:xfrm>
+          <a:off x="0" y="0"/>
+          <a:ext cx="0" cy="0"/>
+          <a:chOff x="0" y="0"/>
+          <a:chExt cx="0" cy="0"/>
+        </a:xfrm>
+      </p:grpSpPr>
       <p:sp>
         <p:nvSpPr>
           <p:cNvPr id="2" name="Title 1"/>
@@ -3731,11 +3794,20 @@
             <p:ph idx="1"/>
           </p:nvPr>
         </p:nvSpPr>
-        <p:spPr/>
-        <p:txBody>
-          <a:bodyPr wrap="square"/>
-          <a:lstStyle/>
-          <a:p/>
+        <p:spPr>
+          <a:xfrm>
+            <a:off x="457200" y="1417638"/>
+            <a:ext cx="8229600" cy="4525963"/>
+          </a:xfrm>
+        </p:spPr>
+        <p:txBody>
+          <a:bodyPr wrap="square">
+            <a:normAutofit fontScale="85000" lnSpcReduction="20000"/>
+          </a:bodyPr>
+          <a:lstStyle/>
+          <a:p>
+            <a:endParaRPr dirty="0"/>
+          </a:p>
           <a:p>
             <a:pPr>
               <a:spcAft>
@@ -3744,7 +3816,12 @@
               <a:defRPr sz="1400"/>
             </a:pPr>
             <a:r>
-              <a:t>Categorie di Endpoint</a:t>
+              <a:rPr dirty="0" err="1"/>
+              <a:t>Categorie</a:t>
+            </a:r>
+            <a:r>
+              <a:rPr dirty="0"/>
+              <a:t> di Endpoint</a:t>
             </a:r>
           </a:p>
           <a:p>
@@ -3755,12 +3832,33 @@
               <a:defRPr sz="1400"/>
             </a:pPr>
             <a:r>
-              <a:t>#### Autenticazione</a:t>
-            </a:r>
-            <a:br/>
-            <a:r>
-              <a:t>• POST /api/token - Genera token LiveKit</a:t>
-            </a:r>
+              <a:rPr dirty="0"/>
+              <a:t>#### </a:t>
+            </a:r>
+            <a:r>
+              <a:rPr dirty="0" err="1"/>
+              <a:t>Autenticazione</a:t>
+            </a:r>
+            <a:br>
+              <a:rPr dirty="0"/>
+            </a:br>
+            <a:r>
+              <a:rPr dirty="0"/>
+              <a:t>• POST /</a:t>
+            </a:r>
+            <a:r>
+              <a:rPr dirty="0" err="1"/>
+              <a:t>api</a:t>
+            </a:r>
+            <a:r>
+              <a:rPr dirty="0"/>
+              <a:t>/token - Genera token </a:t>
+            </a:r>
+            <a:r>
+              <a:rPr dirty="0" err="1"/>
+              <a:t>LiveKit</a:t>
+            </a:r>
+            <a:endParaRPr dirty="0"/>
           </a:p>
           <a:p>
             <a:pPr>
@@ -3770,16 +3868,68 @@
               <a:defRPr sz="1400"/>
             </a:pPr>
             <a:r>
-              <a:t>#### Configurazione</a:t>
-            </a:r>
-            <a:br/>
-            <a:r>
-              <a:t>• GET/POST /api/settings - Gestione impostazioni</a:t>
-            </a:r>
-            <a:br/>
-            <a:r>
-              <a:t>• GET /api/config - Configurazione pubblica</a:t>
-            </a:r>
+              <a:rPr dirty="0"/>
+              <a:t>#### </a:t>
+            </a:r>
+            <a:r>
+              <a:rPr dirty="0" err="1"/>
+              <a:t>Configurazione</a:t>
+            </a:r>
+            <a:br>
+              <a:rPr dirty="0"/>
+            </a:br>
+            <a:r>
+              <a:rPr dirty="0"/>
+              <a:t>• GET/POST /</a:t>
+            </a:r>
+            <a:r>
+              <a:rPr dirty="0" err="1"/>
+              <a:t>api</a:t>
+            </a:r>
+            <a:r>
+              <a:rPr dirty="0"/>
+              <a:t>/settings - </a:t>
+            </a:r>
+            <a:r>
+              <a:rPr dirty="0" err="1"/>
+              <a:t>Gestione</a:t>
+            </a:r>
+            <a:r>
+              <a:rPr dirty="0"/>
+              <a:t> </a:t>
+            </a:r>
+            <a:r>
+              <a:rPr dirty="0" err="1"/>
+              <a:t>impostazioni</a:t>
+            </a:r>
+            <a:br>
+              <a:rPr dirty="0"/>
+            </a:br>
+            <a:r>
+              <a:rPr dirty="0"/>
+              <a:t>• GET /</a:t>
+            </a:r>
+            <a:r>
+              <a:rPr dirty="0" err="1"/>
+              <a:t>api</a:t>
+            </a:r>
+            <a:r>
+              <a:rPr dirty="0"/>
+              <a:t>/config - </a:t>
+            </a:r>
+            <a:r>
+              <a:rPr dirty="0" err="1"/>
+              <a:t>Configurazione</a:t>
+            </a:r>
+            <a:r>
+              <a:rPr dirty="0"/>
+              <a:t> </a:t>
+            </a:r>
+            <a:r>
+              <a:rPr dirty="0" err="1"/>
+              <a:t>pubblica</a:t>
+            </a:r>
+            <a:endParaRPr dirty="0"/>
           </a:p>
           <a:p>
             <a:pPr>
@@ -3789,24 +3939,154 @@
               <a:defRPr sz="1400"/>
             </a:pPr>
             <a:r>
+              <a:rPr dirty="0"/>
               <a:t>#### LLM Management</a:t>
             </a:r>
-            <a:br/>
-            <a:r>
-              <a:t>• GET /api/ollama/models - Lista modelli Ollama</a:t>
-            </a:r>
-            <a:br/>
-            <a:r>
-              <a:t>• GET /api/openrouter/models - Lista modelli OpenRouter (100+)</a:t>
-            </a:r>
-            <a:br/>
-            <a:r>
-              <a:t>• POST /api/ollama/select - Seleziona modello</a:t>
-            </a:r>
-            <a:br/>
-            <a:r>
-              <a:t>• POST /api/openrouter/select - Seleziona modello</a:t>
-            </a:r>
+            <a:br>
+              <a:rPr dirty="0"/>
+            </a:br>
+            <a:r>
+              <a:rPr dirty="0"/>
+              <a:t>• GET /</a:t>
+            </a:r>
+            <a:r>
+              <a:rPr dirty="0" err="1"/>
+              <a:t>api</a:t>
+            </a:r>
+            <a:r>
+              <a:rPr dirty="0"/>
+              <a:t>/</a:t>
+            </a:r>
+            <a:r>
+              <a:rPr dirty="0" err="1"/>
+              <a:t>ollama</a:t>
+            </a:r>
+            <a:r>
+              <a:rPr dirty="0"/>
+              <a:t>/models - Lista </a:t>
+            </a:r>
+            <a:r>
+              <a:rPr dirty="0" err="1"/>
+              <a:t>modelli</a:t>
+            </a:r>
+            <a:r>
+              <a:rPr dirty="0"/>
+              <a:t> </a:t>
+            </a:r>
+            <a:r>
+              <a:rPr dirty="0" err="1"/>
+              <a:t>Ollama</a:t>
+            </a:r>
+            <a:br>
+              <a:rPr dirty="0"/>
+            </a:br>
+            <a:r>
+              <a:rPr dirty="0"/>
+              <a:t>• GET /</a:t>
+            </a:r>
+            <a:r>
+              <a:rPr dirty="0" err="1"/>
+              <a:t>api</a:t>
+            </a:r>
+            <a:r>
+              <a:rPr dirty="0"/>
+              <a:t>/</a:t>
+            </a:r>
+            <a:r>
+              <a:rPr dirty="0" err="1"/>
+              <a:t>openrouter</a:t>
+            </a:r>
+            <a:r>
+              <a:rPr dirty="0"/>
+              <a:t>/models - Lista </a:t>
+            </a:r>
+            <a:r>
+              <a:rPr dirty="0" err="1"/>
+              <a:t>modelli</a:t>
+            </a:r>
+            <a:r>
+              <a:rPr dirty="0"/>
+              <a:t> </a:t>
+            </a:r>
+            <a:r>
+              <a:rPr dirty="0" err="1"/>
+              <a:t>OpenRouter</a:t>
+            </a:r>
+            <a:r>
+              <a:rPr dirty="0"/>
+              <a:t> (100+)</a:t>
+            </a:r>
+            <a:br>
+              <a:rPr dirty="0"/>
+            </a:br>
+            <a:r>
+              <a:rPr dirty="0"/>
+              <a:t>• POST /</a:t>
+            </a:r>
+            <a:r>
+              <a:rPr dirty="0" err="1"/>
+              <a:t>api</a:t>
+            </a:r>
+            <a:r>
+              <a:rPr dirty="0"/>
+              <a:t>/</a:t>
+            </a:r>
+            <a:r>
+              <a:rPr dirty="0" err="1"/>
+              <a:t>ollama</a:t>
+            </a:r>
+            <a:r>
+              <a:rPr dirty="0"/>
+              <a:t>/select - </a:t>
+            </a:r>
+            <a:r>
+              <a:rPr dirty="0" err="1"/>
+              <a:t>Seleziona</a:t>
+            </a:r>
+            <a:r>
+              <a:rPr dirty="0"/>
+              <a:t> </a:t>
+            </a:r>
+            <a:r>
+              <a:rPr dirty="0" err="1"/>
+              <a:t>modello</a:t>
+            </a:r>
+            <a:br>
+              <a:rPr dirty="0"/>
+            </a:br>
+            <a:r>
+              <a:rPr dirty="0"/>
+              <a:t>• POST /</a:t>
+            </a:r>
+            <a:r>
+              <a:rPr dirty="0" err="1"/>
+              <a:t>api</a:t>
+            </a:r>
+            <a:r>
+              <a:rPr dirty="0"/>
+              <a:t>/</a:t>
+            </a:r>
+            <a:r>
+              <a:rPr dirty="0" err="1"/>
+              <a:t>openrouter</a:t>
+            </a:r>
+            <a:r>
+              <a:rPr dirty="0"/>
+              <a:t>/select - </a:t>
+            </a:r>
+            <a:r>
+              <a:rPr dirty="0" err="1"/>
+              <a:t>Seleziona</a:t>
+            </a:r>
+            <a:r>
+              <a:rPr dirty="0"/>
+              <a:t> </a:t>
+            </a:r>
+            <a:r>
+              <a:rPr dirty="0" err="1"/>
+              <a:t>modello</a:t>
+            </a:r>
+            <a:endParaRPr dirty="0"/>
           </a:p>
           <a:p>
             <a:pPr>
@@ -3816,23 +4096,128 @@
               <a:defRPr sz="1400"/>
             </a:pPr>
             <a:r>
+              <a:rPr dirty="0"/>
               <a:t>#### TTS Management</a:t>
             </a:r>
-            <a:br/>
-            <a:r>
-              <a:t>• GET /api/tts/engines - Lista engines</a:t>
-            </a:r>
-            <a:br/>
-            <a:r>
-              <a:t>• GET /api/tts/{engine}/voices - Voci disponibili</a:t>
-            </a:r>
-            <a:br/>
-            <a:r>
-              <a:t>• POST /api/tts/current - Imposta TTS</a:t>
-            </a:r>
-            <a:br/>
-            <a:r>
-              <a:t>• POST /api/tts/test - Test sintesi (ritorna audio)</a:t>
+            <a:br>
+              <a:rPr dirty="0"/>
+            </a:br>
+            <a:r>
+              <a:rPr dirty="0"/>
+              <a:t>• GET /</a:t>
+            </a:r>
+            <a:r>
+              <a:rPr dirty="0" err="1"/>
+              <a:t>api</a:t>
+            </a:r>
+            <a:r>
+              <a:rPr dirty="0"/>
+              <a:t>/</a:t>
+            </a:r>
+            <a:r>
+              <a:rPr dirty="0" err="1"/>
+              <a:t>tts</a:t>
+            </a:r>
+            <a:r>
+              <a:rPr dirty="0"/>
+              <a:t>/engines - Lista engines</a:t>
+            </a:r>
+            <a:br>
+              <a:rPr dirty="0"/>
+            </a:br>
+            <a:r>
+              <a:rPr dirty="0"/>
+              <a:t>• GET /</a:t>
+            </a:r>
+            <a:r>
+              <a:rPr dirty="0" err="1"/>
+              <a:t>api</a:t>
+            </a:r>
+            <a:r>
+              <a:rPr dirty="0"/>
+              <a:t>/</a:t>
+            </a:r>
+            <a:r>
+              <a:rPr dirty="0" err="1"/>
+              <a:t>tts</a:t>
+            </a:r>
+            <a:r>
+              <a:rPr dirty="0"/>
+              <a:t>/{engine}/voices - Voci </a:t>
+            </a:r>
+            <a:r>
+              <a:rPr dirty="0" err="1"/>
+              <a:t>disponibili</a:t>
+            </a:r>
+            <a:br>
+              <a:rPr dirty="0"/>
+            </a:br>
+            <a:r>
+              <a:rPr dirty="0"/>
+              <a:t>• POST /</a:t>
+            </a:r>
+            <a:r>
+              <a:rPr dirty="0" err="1"/>
+              <a:t>api</a:t>
+            </a:r>
+            <a:r>
+              <a:rPr dirty="0"/>
+              <a:t>/</a:t>
+            </a:r>
+            <a:r>
+              <a:rPr dirty="0" err="1"/>
+              <a:t>tts</a:t>
+            </a:r>
+            <a:r>
+              <a:rPr dirty="0"/>
+              <a:t>/current - </a:t>
+            </a:r>
+            <a:r>
+              <a:rPr dirty="0" err="1"/>
+              <a:t>Imposta</a:t>
+            </a:r>
+            <a:r>
+              <a:rPr dirty="0"/>
+              <a:t> TTS</a:t>
+            </a:r>
+            <a:br>
+              <a:rPr dirty="0"/>
+            </a:br>
+            <a:r>
+              <a:rPr dirty="0"/>
+              <a:t>• POST /</a:t>
+            </a:r>
+            <a:r>
+              <a:rPr dirty="0" err="1"/>
+              <a:t>api</a:t>
+            </a:r>
+            <a:r>
+              <a:rPr dirty="0"/>
+              <a:t>/</a:t>
+            </a:r>
+            <a:r>
+              <a:rPr dirty="0" err="1"/>
+              <a:t>tts</a:t>
+            </a:r>
+            <a:r>
+              <a:rPr dirty="0"/>
+              <a:t>/test - Test </a:t>
+            </a:r>
+            <a:r>
+              <a:rPr dirty="0" err="1"/>
+              <a:t>sintesi</a:t>
+            </a:r>
+            <a:r>
+              <a:rPr dirty="0"/>
+              <a:t> (</a:t>
+            </a:r>
+            <a:r>
+              <a:rPr dirty="0" err="1"/>
+              <a:t>ritorna</a:t>
+            </a:r>
+            <a:r>
+              <a:rPr dirty="0"/>
+              <a:t> audio)</a:t>
             </a:r>
           </a:p>
           <a:p>
@@ -3843,16 +4228,60 @@
               <a:defRPr sz="1400"/>
             </a:pPr>
             <a:r>
+              <a:rPr dirty="0"/>
               <a:t>#### Chat Management</a:t>
             </a:r>
-            <a:br/>
-            <a:r>
-              <a:t>• GET/POST /api/chats - Gestione chat</a:t>
-            </a:r>
-            <a:br/>
-            <a:r>
-              <a:t>• GET /api/chats/{id} - Dettagli con messaggi</a:t>
-            </a:r>
+            <a:br>
+              <a:rPr dirty="0"/>
+            </a:br>
+            <a:r>
+              <a:rPr dirty="0"/>
+              <a:t>• GET/POST /</a:t>
+            </a:r>
+            <a:r>
+              <a:rPr dirty="0" err="1"/>
+              <a:t>api</a:t>
+            </a:r>
+            <a:r>
+              <a:rPr dirty="0"/>
+              <a:t>/chats - </a:t>
+            </a:r>
+            <a:r>
+              <a:rPr dirty="0" err="1"/>
+              <a:t>Gestione</a:t>
+            </a:r>
+            <a:r>
+              <a:rPr dirty="0"/>
+              <a:t> chat</a:t>
+            </a:r>
+            <a:br>
+              <a:rPr dirty="0"/>
+            </a:br>
+            <a:r>
+              <a:rPr dirty="0"/>
+              <a:t>• GET /</a:t>
+            </a:r>
+            <a:r>
+              <a:rPr dirty="0" err="1"/>
+              <a:t>api</a:t>
+            </a:r>
+            <a:r>
+              <a:rPr dirty="0"/>
+              <a:t>/chats/{id} - </a:t>
+            </a:r>
+            <a:r>
+              <a:rPr dirty="0" err="1"/>
+              <a:t>Dettagli</a:t>
+            </a:r>
+            <a:r>
+              <a:rPr dirty="0"/>
+              <a:t> con </a:t>
+            </a:r>
+            <a:r>
+              <a:rPr dirty="0" err="1"/>
+              <a:t>messaggi</a:t>
+            </a:r>
+            <a:endParaRPr dirty="0"/>
           </a:p>
           <a:p>
             <a:pPr>
@@ -3862,19 +4291,65 @@
               <a:defRPr sz="1400"/>
             </a:pPr>
             <a:r>
+              <a:rPr dirty="0"/>
               <a:t>#### Status</a:t>
             </a:r>
-            <a:br/>
-            <a:r>
-              <a:t>• GET /api/health - Health check</a:t>
-            </a:r>
-            <a:br/>
-            <a:r>
-              <a:t>• GET /api/status - Status tutti servizi</a:t>
-            </a:r>
-            <a:br/>
-            <a:r>
-              <a:t>• GET /api/timing - Metriche performance</a:t>
+            <a:br>
+              <a:rPr dirty="0"/>
+            </a:br>
+            <a:r>
+              <a:rPr dirty="0"/>
+              <a:t>• GET /</a:t>
+            </a:r>
+            <a:r>
+              <a:rPr dirty="0" err="1"/>
+              <a:t>api</a:t>
+            </a:r>
+            <a:r>
+              <a:rPr dirty="0"/>
+              <a:t>/health - Health check</a:t>
+            </a:r>
+            <a:br>
+              <a:rPr dirty="0"/>
+            </a:br>
+            <a:r>
+              <a:rPr dirty="0"/>
+              <a:t>• GET /</a:t>
+            </a:r>
+            <a:r>
+              <a:rPr dirty="0" err="1"/>
+              <a:t>api</a:t>
+            </a:r>
+            <a:r>
+              <a:rPr dirty="0"/>
+              <a:t>/status - Status tutti </a:t>
+            </a:r>
+            <a:r>
+              <a:rPr dirty="0" err="1"/>
+              <a:t>servizi</a:t>
+            </a:r>
+            <a:br>
+              <a:rPr dirty="0"/>
+            </a:br>
+            <a:r>
+              <a:rPr dirty="0"/>
+              <a:t>• GET /</a:t>
+            </a:r>
+            <a:r>
+              <a:rPr dirty="0" err="1"/>
+              <a:t>api</a:t>
+            </a:r>
+            <a:r>
+              <a:rPr dirty="0"/>
+              <a:t>/timing - </a:t>
+            </a:r>
+            <a:r>
+              <a:rPr dirty="0" err="1"/>
+              <a:t>Metriche</a:t>
+            </a:r>
+            <a:r>
+              <a:rPr dirty="0"/>
+              <a:t> performance</a:t>
             </a:r>
           </a:p>
         </p:txBody>
@@ -3888,7 +4363,7 @@
 </file>
 
 <file path=ppt/slides/slide17.xml><?xml version="1.0" encoding="utf-8"?>
-<p:sld xmlns:a="http://schemas.openxmlformats.org/drawingml/2006/main" xmlns:p="http://schemas.openxmlformats.org/presentationml/2006/main" xmlns:r="http://schemas.openxmlformats.org/officeDocument/2006/relationships">
+<p:sld xmlns:a="http://schemas.openxmlformats.org/drawingml/2006/main" xmlns:r="http://schemas.openxmlformats.org/officeDocument/2006/relationships" xmlns:p="http://schemas.openxmlformats.org/presentationml/2006/main">
   <p:cSld>
     <p:spTree>
       <p:nvGrpSpPr>
@@ -3896,7 +4371,14 @@
         <p:cNvGrpSpPr/>
         <p:nvPr/>
       </p:nvGrpSpPr>
-      <p:grpSpPr/>
+      <p:grpSpPr>
+        <a:xfrm>
+          <a:off x="0" y="0"/>
+          <a:ext cx="0" cy="0"/>
+          <a:chOff x="0" y="0"/>
+          <a:chExt cx="0" cy="0"/>
+        </a:xfrm>
+      </p:grpSpPr>
       <p:sp>
         <p:nvSpPr>
           <p:cNvPr id="2" name="Title 1"/>
@@ -3932,7 +4414,9 @@
         <p:txBody>
           <a:bodyPr wrap="square"/>
           <a:lstStyle/>
-          <a:p/>
+          <a:p>
+            <a:endParaRPr/>
+          </a:p>
           <a:p>
             <a:pPr>
               <a:spcAft>
@@ -4015,7 +4499,7 @@
 </file>
 
 <file path=ppt/slides/slide18.xml><?xml version="1.0" encoding="utf-8"?>
-<p:sld xmlns:a="http://schemas.openxmlformats.org/drawingml/2006/main" xmlns:p="http://schemas.openxmlformats.org/presentationml/2006/main" xmlns:r="http://schemas.openxmlformats.org/officeDocument/2006/relationships">
+<p:sld xmlns:a="http://schemas.openxmlformats.org/drawingml/2006/main" xmlns:r="http://schemas.openxmlformats.org/officeDocument/2006/relationships" xmlns:p="http://schemas.openxmlformats.org/presentationml/2006/main">
   <p:cSld>
     <p:spTree>
       <p:nvGrpSpPr>
@@ -4023,7 +4507,14 @@
         <p:cNvGrpSpPr/>
         <p:nvPr/>
       </p:nvGrpSpPr>
-      <p:grpSpPr/>
+      <p:grpSpPr>
+        <a:xfrm>
+          <a:off x="0" y="0"/>
+          <a:ext cx="0" cy="0"/>
+          <a:chOff x="0" y="0"/>
+          <a:chExt cx="0" cy="0"/>
+        </a:xfrm>
+      </p:grpSpPr>
       <p:sp>
         <p:nvSpPr>
           <p:cNvPr id="2" name="Title 1"/>
@@ -4059,7 +4550,9 @@
         <p:txBody>
           <a:bodyPr wrap="square"/>
           <a:lstStyle/>
-          <a:p/>
+          <a:p>
+            <a:endParaRPr/>
+          </a:p>
           <a:p>
             <a:pPr>
               <a:spcAft>
@@ -4185,7 +4678,7 @@
 </file>
 
 <file path=ppt/slides/slide19.xml><?xml version="1.0" encoding="utf-8"?>
-<p:sld xmlns:a="http://schemas.openxmlformats.org/drawingml/2006/main" xmlns:p="http://schemas.openxmlformats.org/presentationml/2006/main" xmlns:r="http://schemas.openxmlformats.org/officeDocument/2006/relationships">
+<p:sld xmlns:a="http://schemas.openxmlformats.org/drawingml/2006/main" xmlns:r="http://schemas.openxmlformats.org/officeDocument/2006/relationships" xmlns:p="http://schemas.openxmlformats.org/presentationml/2006/main">
   <p:cSld>
     <p:spTree>
       <p:nvGrpSpPr>
@@ -4193,7 +4686,14 @@
         <p:cNvGrpSpPr/>
         <p:nvPr/>
       </p:nvGrpSpPr>
-      <p:grpSpPr/>
+      <p:grpSpPr>
+        <a:xfrm>
+          <a:off x="0" y="0"/>
+          <a:ext cx="0" cy="0"/>
+          <a:chOff x="0" y="0"/>
+          <a:chExt cx="0" cy="0"/>
+        </a:xfrm>
+      </p:grpSpPr>
       <p:sp>
         <p:nvSpPr>
           <p:cNvPr id="2" name="Title 1"/>
@@ -4225,11 +4725,20 @@
             <p:ph idx="1"/>
           </p:nvPr>
         </p:nvSpPr>
-        <p:spPr/>
-        <p:txBody>
-          <a:bodyPr wrap="square"/>
-          <a:lstStyle/>
-          <a:p/>
+        <p:spPr>
+          <a:xfrm>
+            <a:off x="457200" y="1417638"/>
+            <a:ext cx="8229600" cy="4525963"/>
+          </a:xfrm>
+        </p:spPr>
+        <p:txBody>
+          <a:bodyPr wrap="square">
+            <a:normAutofit fontScale="92500" lnSpcReduction="20000"/>
+          </a:bodyPr>
+          <a:lstStyle/>
+          <a:p>
+            <a:endParaRPr dirty="0"/>
+          </a:p>
           <a:p>
             <a:pPr>
               <a:spcAft>
@@ -4238,8 +4747,18 @@
               <a:defRPr sz="1400"/>
             </a:pPr>
             <a:r>
-              <a:t>Funzionalità Aggiuntive</a:t>
-            </a:r>
+              <a:rPr dirty="0" err="1"/>
+              <a:t>Funzionalità</a:t>
+            </a:r>
+            <a:r>
+              <a:rPr dirty="0"/>
+              <a:t> </a:t>
+            </a:r>
+            <a:r>
+              <a:rPr dirty="0" err="1"/>
+              <a:t>Aggiuntive</a:t>
+            </a:r>
+            <a:endParaRPr dirty="0"/>
           </a:p>
           <a:p>
             <a:pPr>
@@ -4249,20 +4768,63 @@
               <a:defRPr sz="1400"/>
             </a:pPr>
             <a:r>
+              <a:rPr dirty="0"/>
               <a:t>#### 1. Video Analysis</a:t>
             </a:r>
-            <a:br/>
-            <a:r>
-              <a:t>• Estrazione frame da webcam/screen</a:t>
-            </a:r>
-            <a:br/>
-            <a:r>
-              <a:t>• Analisi con GPT-4 Vision o LLaVA</a:t>
-            </a:r>
-            <a:br/>
-            <a:r>
-              <a:t>• Function calling per analisi specifiche</a:t>
-            </a:r>
+            <a:br>
+              <a:rPr dirty="0"/>
+            </a:br>
+            <a:r>
+              <a:rPr dirty="0"/>
+              <a:t>• </a:t>
+            </a:r>
+            <a:r>
+              <a:rPr dirty="0" err="1"/>
+              <a:t>Estrazione</a:t>
+            </a:r>
+            <a:r>
+              <a:rPr dirty="0"/>
+              <a:t> frame da webcam/screen</a:t>
+            </a:r>
+            <a:br>
+              <a:rPr dirty="0"/>
+            </a:br>
+            <a:r>
+              <a:rPr dirty="0"/>
+              <a:t>• </a:t>
+            </a:r>
+            <a:r>
+              <a:rPr dirty="0" err="1"/>
+              <a:t>Analisi</a:t>
+            </a:r>
+            <a:r>
+              <a:rPr dirty="0"/>
+              <a:t> con GPT-4 Vision o </a:t>
+            </a:r>
+            <a:r>
+              <a:rPr dirty="0" err="1"/>
+              <a:t>LLaVA</a:t>
+            </a:r>
+            <a:br>
+              <a:rPr dirty="0"/>
+            </a:br>
+            <a:r>
+              <a:rPr dirty="0"/>
+              <a:t>• Function calling per </a:t>
+            </a:r>
+            <a:r>
+              <a:rPr dirty="0" err="1"/>
+              <a:t>analisi</a:t>
+            </a:r>
+            <a:r>
+              <a:rPr dirty="0"/>
+              <a:t> </a:t>
+            </a:r>
+            <a:r>
+              <a:rPr dirty="0" err="1"/>
+              <a:t>specifiche</a:t>
+            </a:r>
+            <a:endParaRPr dirty="0"/>
           </a:p>
           <a:p>
             <a:pPr>
@@ -4272,18 +4834,36 @@
               <a:defRPr sz="1400"/>
             </a:pPr>
             <a:r>
+              <a:rPr dirty="0"/>
               <a:t>#### 2. Voice Cloning (Chatterbox)</a:t>
             </a:r>
-            <a:br/>
-            <a:r>
-              <a:t>• Clona voce da file audio</a:t>
-            </a:r>
-            <a:br/>
-            <a:r>
+            <a:br>
+              <a:rPr dirty="0"/>
+            </a:br>
+            <a:r>
+              <a:rPr dirty="0"/>
+              <a:t>• </a:t>
+            </a:r>
+            <a:r>
+              <a:rPr dirty="0" err="1"/>
+              <a:t>Clona</a:t>
+            </a:r>
+            <a:r>
+              <a:rPr dirty="0"/>
+              <a:t> voce da file audio</a:t>
+            </a:r>
+            <a:br>
+              <a:rPr dirty="0"/>
+            </a:br>
+            <a:r>
+              <a:rPr dirty="0"/>
               <a:t>• Emotion control</a:t>
             </a:r>
-            <a:br/>
-            <a:r>
+            <a:br>
+              <a:rPr dirty="0"/>
+            </a:br>
+            <a:r>
+              <a:rPr dirty="0"/>
               <a:t>• Exaggeration control</a:t>
             </a:r>
           </a:p>
@@ -4295,20 +4875,59 @@
               <a:defRPr sz="1400"/>
             </a:pPr>
             <a:r>
+              <a:rPr dirty="0"/>
               <a:t>#### 3. Multi-Language Support</a:t>
             </a:r>
-            <a:br/>
-            <a:r>
+            <a:br>
+              <a:rPr dirty="0"/>
+            </a:br>
+            <a:r>
+              <a:rPr dirty="0"/>
               <a:t>• Auto-detection lingua (Whisper)</a:t>
             </a:r>
-            <a:br/>
-            <a:r>
-              <a:t>• TTS multilingua (Edge, Kokoro, Chatterbox)</a:t>
-            </a:r>
-            <a:br/>
-            <a:r>
-              <a:t>• LLM risponde nella lingua dell'utente</a:t>
-            </a:r>
+            <a:br>
+              <a:rPr dirty="0"/>
+            </a:br>
+            <a:r>
+              <a:rPr dirty="0"/>
+              <a:t>• TTS </a:t>
+            </a:r>
+            <a:r>
+              <a:rPr dirty="0" err="1"/>
+              <a:t>multilingua</a:t>
+            </a:r>
+            <a:r>
+              <a:rPr dirty="0"/>
+              <a:t> (Edge, Kokoro, Chatterbox)</a:t>
+            </a:r>
+            <a:br>
+              <a:rPr dirty="0"/>
+            </a:br>
+            <a:r>
+              <a:rPr dirty="0"/>
+              <a:t>• LLM </a:t>
+            </a:r>
+            <a:r>
+              <a:rPr dirty="0" err="1"/>
+              <a:t>risponde</a:t>
+            </a:r>
+            <a:r>
+              <a:rPr dirty="0"/>
+              <a:t> </a:t>
+            </a:r>
+            <a:r>
+              <a:rPr dirty="0" err="1"/>
+              <a:t>nella</a:t>
+            </a:r>
+            <a:r>
+              <a:rPr dirty="0"/>
+              <a:t> lingua </a:t>
+            </a:r>
+            <a:r>
+              <a:rPr dirty="0" err="1"/>
+              <a:t>dell'utente</a:t>
+            </a:r>
+            <a:endParaRPr dirty="0"/>
           </a:p>
           <a:p>
             <a:pPr>
@@ -4318,18 +4937,48 @@
               <a:defRPr sz="1400"/>
             </a:pPr>
             <a:r>
+              <a:rPr dirty="0"/>
               <a:t>#### 4. Conversation History</a:t>
             </a:r>
-            <a:br/>
-            <a:r>
-              <a:t>• Persistenza completa in PostgreSQL</a:t>
-            </a:r>
-            <a:br/>
-            <a:r>
-              <a:t>• Context injection configurabile</a:t>
-            </a:r>
-            <a:br/>
-            <a:r>
+            <a:br>
+              <a:rPr dirty="0"/>
+            </a:br>
+            <a:r>
+              <a:rPr dirty="0"/>
+              <a:t>• </a:t>
+            </a:r>
+            <a:r>
+              <a:rPr dirty="0" err="1"/>
+              <a:t>Persistenza</a:t>
+            </a:r>
+            <a:r>
+              <a:rPr dirty="0"/>
+              <a:t> </a:t>
+            </a:r>
+            <a:r>
+              <a:rPr dirty="0" err="1"/>
+              <a:t>completa</a:t>
+            </a:r>
+            <a:r>
+              <a:rPr dirty="0"/>
+              <a:t> in PostgreSQL</a:t>
+            </a:r>
+            <a:br>
+              <a:rPr dirty="0"/>
+            </a:br>
+            <a:r>
+              <a:rPr dirty="0"/>
+              <a:t>• Context injection </a:t>
+            </a:r>
+            <a:r>
+              <a:rPr dirty="0" err="1"/>
+              <a:t>configurabile</a:t>
+            </a:r>
+            <a:br>
+              <a:rPr dirty="0"/>
+            </a:br>
+            <a:r>
+              <a:rPr dirty="0"/>
               <a:t>• Chat management via API</a:t>
             </a:r>
           </a:p>
@@ -4341,18 +4990,28 @@
               <a:defRPr sz="1400"/>
             </a:pPr>
             <a:r>
+              <a:rPr dirty="0"/>
               <a:t>#### 5. Real-Time Metrics</a:t>
             </a:r>
-            <a:br/>
-            <a:r>
+            <a:br>
+              <a:rPr dirty="0"/>
+            </a:br>
+            <a:r>
+              <a:rPr dirty="0"/>
               <a:t>• Timing stats via API</a:t>
             </a:r>
-            <a:br/>
-            <a:r>
+            <a:br>
+              <a:rPr dirty="0"/>
+            </a:br>
+            <a:r>
+              <a:rPr dirty="0"/>
               <a:t>• Service status monitoring</a:t>
             </a:r>
-            <a:br/>
-            <a:r>
+            <a:br>
+              <a:rPr dirty="0"/>
+            </a:br>
+            <a:r>
+              <a:rPr dirty="0"/>
               <a:t>• Performance tracking</a:t>
             </a:r>
           </a:p>
@@ -4367,7 +5026,7 @@
 </file>
 
 <file path=ppt/slides/slide2.xml><?xml version="1.0" encoding="utf-8"?>
-<p:sld xmlns:a="http://schemas.openxmlformats.org/drawingml/2006/main" xmlns:p="http://schemas.openxmlformats.org/presentationml/2006/main" xmlns:r="http://schemas.openxmlformats.org/officeDocument/2006/relationships">
+<p:sld xmlns:a="http://schemas.openxmlformats.org/drawingml/2006/main" xmlns:r="http://schemas.openxmlformats.org/officeDocument/2006/relationships" xmlns:p="http://schemas.openxmlformats.org/presentationml/2006/main">
   <p:cSld>
     <p:spTree>
       <p:nvGrpSpPr>
@@ -4375,7 +5034,14 @@
         <p:cNvGrpSpPr/>
         <p:nvPr/>
       </p:nvGrpSpPr>
-      <p:grpSpPr/>
+      <p:grpSpPr>
+        <a:xfrm>
+          <a:off x="0" y="0"/>
+          <a:ext cx="0" cy="0"/>
+          <a:chOff x="0" y="0"/>
+          <a:chExt cx="0" cy="0"/>
+        </a:xfrm>
+      </p:grpSpPr>
       <p:sp>
         <p:nvSpPr>
           <p:cNvPr id="2" name="Title 1"/>
@@ -4411,7 +5077,9 @@
         <p:txBody>
           <a:bodyPr wrap="square"/>
           <a:lstStyle/>
-          <a:p/>
+          <a:p>
+            <a:endParaRPr/>
+          </a:p>
           <a:p>
             <a:pPr>
               <a:spcAft>
@@ -4438,7 +5106,7 @@
 </file>
 
 <file path=ppt/slides/slide20.xml><?xml version="1.0" encoding="utf-8"?>
-<p:sld xmlns:a="http://schemas.openxmlformats.org/drawingml/2006/main" xmlns:p="http://schemas.openxmlformats.org/presentationml/2006/main" xmlns:r="http://schemas.openxmlformats.org/officeDocument/2006/relationships">
+<p:sld xmlns:a="http://schemas.openxmlformats.org/drawingml/2006/main" xmlns:r="http://schemas.openxmlformats.org/officeDocument/2006/relationships" xmlns:p="http://schemas.openxmlformats.org/presentationml/2006/main">
   <p:cSld>
     <p:spTree>
       <p:nvGrpSpPr>
@@ -4446,7 +5114,14 @@
         <p:cNvGrpSpPr/>
         <p:nvPr/>
       </p:nvGrpSpPr>
-      <p:grpSpPr/>
+      <p:grpSpPr>
+        <a:xfrm>
+          <a:off x="0" y="0"/>
+          <a:ext cx="0" cy="0"/>
+          <a:chOff x="0" y="0"/>
+          <a:chExt cx="0" cy="0"/>
+        </a:xfrm>
+      </p:grpSpPr>
       <p:sp>
         <p:nvSpPr>
           <p:cNvPr id="2" name="Title 1"/>
@@ -4482,7 +5157,9 @@
         <p:txBody>
           <a:bodyPr wrap="square"/>
           <a:lstStyle/>
-          <a:p/>
+          <a:p>
+            <a:endParaRPr/>
+          </a:p>
           <a:p>
             <a:pPr>
               <a:spcAft>
@@ -4590,7 +5267,7 @@
 </file>
 
 <file path=ppt/slides/slide21.xml><?xml version="1.0" encoding="utf-8"?>
-<p:sld xmlns:a="http://schemas.openxmlformats.org/drawingml/2006/main" xmlns:p="http://schemas.openxmlformats.org/presentationml/2006/main" xmlns:r="http://schemas.openxmlformats.org/officeDocument/2006/relationships">
+<p:sld xmlns:a="http://schemas.openxmlformats.org/drawingml/2006/main" xmlns:r="http://schemas.openxmlformats.org/officeDocument/2006/relationships" xmlns:p="http://schemas.openxmlformats.org/presentationml/2006/main">
   <p:cSld>
     <p:spTree>
       <p:nvGrpSpPr>
@@ -4598,7 +5275,14 @@
         <p:cNvGrpSpPr/>
         <p:nvPr/>
       </p:nvGrpSpPr>
-      <p:grpSpPr/>
+      <p:grpSpPr>
+        <a:xfrm>
+          <a:off x="0" y="0"/>
+          <a:ext cx="0" cy="0"/>
+          <a:chOff x="0" y="0"/>
+          <a:chExt cx="0" cy="0"/>
+        </a:xfrm>
+      </p:grpSpPr>
       <p:sp>
         <p:nvSpPr>
           <p:cNvPr id="2" name="Title 1"/>
@@ -4634,7 +5318,9 @@
         <p:txBody>
           <a:bodyPr wrap="square"/>
           <a:lstStyle/>
-          <a:p/>
+          <a:p>
+            <a:endParaRPr/>
+          </a:p>
           <a:p>
             <a:pPr>
               <a:spcAft>
@@ -4732,7 +5418,7 @@
 </file>
 
 <file path=ppt/slides/slide22.xml><?xml version="1.0" encoding="utf-8"?>
-<p:sld xmlns:a="http://schemas.openxmlformats.org/drawingml/2006/main" xmlns:p="http://schemas.openxmlformats.org/presentationml/2006/main" xmlns:r="http://schemas.openxmlformats.org/officeDocument/2006/relationships">
+<p:sld xmlns:a="http://schemas.openxmlformats.org/drawingml/2006/main" xmlns:r="http://schemas.openxmlformats.org/officeDocument/2006/relationships" xmlns:p="http://schemas.openxmlformats.org/presentationml/2006/main">
   <p:cSld>
     <p:spTree>
       <p:nvGrpSpPr>
@@ -4740,7 +5426,14 @@
         <p:cNvGrpSpPr/>
         <p:nvPr/>
       </p:nvGrpSpPr>
-      <p:grpSpPr/>
+      <p:grpSpPr>
+        <a:xfrm>
+          <a:off x="0" y="0"/>
+          <a:ext cx="0" cy="0"/>
+          <a:chOff x="0" y="0"/>
+          <a:chExt cx="0" cy="0"/>
+        </a:xfrm>
+      </p:grpSpPr>
       <p:sp>
         <p:nvSpPr>
           <p:cNvPr id="2" name="Title 1"/>
@@ -4776,7 +5469,9 @@
         <p:txBody>
           <a:bodyPr wrap="square"/>
           <a:lstStyle/>
-          <a:p/>
+          <a:p>
+            <a:endParaRPr/>
+          </a:p>
           <a:p>
             <a:pPr>
               <a:spcAft>
@@ -4888,7 +5583,7 @@
 </file>
 
 <file path=ppt/slides/slide23.xml><?xml version="1.0" encoding="utf-8"?>
-<p:sld xmlns:a="http://schemas.openxmlformats.org/drawingml/2006/main" xmlns:p="http://schemas.openxmlformats.org/presentationml/2006/main" xmlns:r="http://schemas.openxmlformats.org/officeDocument/2006/relationships">
+<p:sld xmlns:a="http://schemas.openxmlformats.org/drawingml/2006/main" xmlns:r="http://schemas.openxmlformats.org/officeDocument/2006/relationships" xmlns:p="http://schemas.openxmlformats.org/presentationml/2006/main">
   <p:cSld>
     <p:spTree>
       <p:nvGrpSpPr>
@@ -4896,7 +5591,14 @@
         <p:cNvGrpSpPr/>
         <p:nvPr/>
       </p:nvGrpSpPr>
-      <p:grpSpPr/>
+      <p:grpSpPr>
+        <a:xfrm>
+          <a:off x="0" y="0"/>
+          <a:ext cx="0" cy="0"/>
+          <a:chOff x="0" y="0"/>
+          <a:chExt cx="0" cy="0"/>
+        </a:xfrm>
+      </p:grpSpPr>
       <p:sp>
         <p:nvSpPr>
           <p:cNvPr id="2" name="Title 1"/>
@@ -4932,7 +5634,9 @@
         <p:txBody>
           <a:bodyPr wrap="square"/>
           <a:lstStyle/>
-          <a:p/>
+          <a:p>
+            <a:endParaRPr/>
+          </a:p>
           <a:p>
             <a:pPr>
               <a:spcAft>
@@ -5015,7 +5719,7 @@
 </file>
 
 <file path=ppt/slides/slide24.xml><?xml version="1.0" encoding="utf-8"?>
-<p:sld xmlns:a="http://schemas.openxmlformats.org/drawingml/2006/main" xmlns:p="http://schemas.openxmlformats.org/presentationml/2006/main" xmlns:r="http://schemas.openxmlformats.org/officeDocument/2006/relationships">
+<p:sld xmlns:a="http://schemas.openxmlformats.org/drawingml/2006/main" xmlns:r="http://schemas.openxmlformats.org/officeDocument/2006/relationships" xmlns:p="http://schemas.openxmlformats.org/presentationml/2006/main">
   <p:cSld>
     <p:spTree>
       <p:nvGrpSpPr>
@@ -5023,7 +5727,14 @@
         <p:cNvGrpSpPr/>
         <p:nvPr/>
       </p:nvGrpSpPr>
-      <p:grpSpPr/>
+      <p:grpSpPr>
+        <a:xfrm>
+          <a:off x="0" y="0"/>
+          <a:ext cx="0" cy="0"/>
+          <a:chOff x="0" y="0"/>
+          <a:chExt cx="0" cy="0"/>
+        </a:xfrm>
+      </p:grpSpPr>
       <p:sp>
         <p:nvSpPr>
           <p:cNvPr id="2" name="Title 1"/>
@@ -5059,7 +5770,9 @@
         <p:txBody>
           <a:bodyPr wrap="square"/>
           <a:lstStyle/>
-          <a:p/>
+          <a:p>
+            <a:endParaRPr/>
+          </a:p>
           <a:p>
             <a:pPr>
               <a:spcAft>
@@ -5133,7 +5846,7 @@
 </file>
 
 <file path=ppt/slides/slide25.xml><?xml version="1.0" encoding="utf-8"?>
-<p:sld xmlns:a="http://schemas.openxmlformats.org/drawingml/2006/main" xmlns:p="http://schemas.openxmlformats.org/presentationml/2006/main" xmlns:r="http://schemas.openxmlformats.org/officeDocument/2006/relationships">
+<p:sld xmlns:a="http://schemas.openxmlformats.org/drawingml/2006/main" xmlns:r="http://schemas.openxmlformats.org/officeDocument/2006/relationships" xmlns:p="http://schemas.openxmlformats.org/presentationml/2006/main">
   <p:cSld>
     <p:spTree>
       <p:nvGrpSpPr>
@@ -5141,7 +5854,14 @@
         <p:cNvGrpSpPr/>
         <p:nvPr/>
       </p:nvGrpSpPr>
-      <p:grpSpPr/>
+      <p:grpSpPr>
+        <a:xfrm>
+          <a:off x="0" y="0"/>
+          <a:ext cx="0" cy="0"/>
+          <a:chOff x="0" y="0"/>
+          <a:chExt cx="0" cy="0"/>
+        </a:xfrm>
+      </p:grpSpPr>
       <p:sp>
         <p:nvSpPr>
           <p:cNvPr id="2" name="Title 1"/>
@@ -5177,7 +5897,9 @@
         <p:txBody>
           <a:bodyPr wrap="square"/>
           <a:lstStyle/>
-          <a:p/>
+          <a:p>
+            <a:endParaRPr/>
+          </a:p>
           <a:p>
             <a:pPr>
               <a:spcAft>
@@ -5200,7 +5922,7 @@
 </file>
 
 <file path=ppt/slides/slide26.xml><?xml version="1.0" encoding="utf-8"?>
-<p:sld xmlns:a="http://schemas.openxmlformats.org/drawingml/2006/main" xmlns:p="http://schemas.openxmlformats.org/presentationml/2006/main" xmlns:r="http://schemas.openxmlformats.org/officeDocument/2006/relationships">
+<p:sld xmlns:a="http://schemas.openxmlformats.org/drawingml/2006/main" xmlns:r="http://schemas.openxmlformats.org/officeDocument/2006/relationships" xmlns:p="http://schemas.openxmlformats.org/presentationml/2006/main">
   <p:cSld>
     <p:spTree>
       <p:nvGrpSpPr>
@@ -5208,7 +5930,14 @@
         <p:cNvGrpSpPr/>
         <p:nvPr/>
       </p:nvGrpSpPr>
-      <p:grpSpPr/>
+      <p:grpSpPr>
+        <a:xfrm>
+          <a:off x="0" y="0"/>
+          <a:ext cx="0" cy="0"/>
+          <a:chOff x="0" y="0"/>
+          <a:chExt cx="0" cy="0"/>
+        </a:xfrm>
+      </p:grpSpPr>
       <p:sp>
         <p:nvSpPr>
           <p:cNvPr id="2" name="Title 1"/>
@@ -5244,7 +5973,9 @@
         <p:txBody>
           <a:bodyPr wrap="square"/>
           <a:lstStyle/>
-          <a:p/>
+          <a:p>
+            <a:endParaRPr/>
+          </a:p>
           <a:p>
             <a:pPr>
               <a:spcAft>
@@ -5362,7 +6093,7 @@
 </file>
 
 <file path=ppt/slides/slide27.xml><?xml version="1.0" encoding="utf-8"?>
-<p:sld xmlns:a="http://schemas.openxmlformats.org/drawingml/2006/main" xmlns:p="http://schemas.openxmlformats.org/presentationml/2006/main" xmlns:r="http://schemas.openxmlformats.org/officeDocument/2006/relationships">
+<p:sld xmlns:a="http://schemas.openxmlformats.org/drawingml/2006/main" xmlns:r="http://schemas.openxmlformats.org/officeDocument/2006/relationships" xmlns:p="http://schemas.openxmlformats.org/presentationml/2006/main">
   <p:cSld>
     <p:spTree>
       <p:nvGrpSpPr>
@@ -5370,7 +6101,14 @@
         <p:cNvGrpSpPr/>
         <p:nvPr/>
       </p:nvGrpSpPr>
-      <p:grpSpPr/>
+      <p:grpSpPr>
+        <a:xfrm>
+          <a:off x="0" y="0"/>
+          <a:ext cx="0" cy="0"/>
+          <a:chOff x="0" y="0"/>
+          <a:chExt cx="0" cy="0"/>
+        </a:xfrm>
+      </p:grpSpPr>
       <p:sp>
         <p:nvSpPr>
           <p:cNvPr id="2" name="Title 1"/>
@@ -5406,7 +6144,9 @@
         <p:txBody>
           <a:bodyPr wrap="square"/>
           <a:lstStyle/>
-          <a:p/>
+          <a:p>
+            <a:endParaRPr/>
+          </a:p>
           <a:p>
             <a:pPr>
               <a:spcAft>
@@ -5440,7 +6180,7 @@
 </file>
 
 <file path=ppt/slides/slide28.xml><?xml version="1.0" encoding="utf-8"?>
-<p:sld xmlns:a="http://schemas.openxmlformats.org/drawingml/2006/main" xmlns:p="http://schemas.openxmlformats.org/presentationml/2006/main" xmlns:r="http://schemas.openxmlformats.org/officeDocument/2006/relationships">
+<p:sld xmlns:a="http://schemas.openxmlformats.org/drawingml/2006/main" xmlns:r="http://schemas.openxmlformats.org/officeDocument/2006/relationships" xmlns:p="http://schemas.openxmlformats.org/presentationml/2006/main">
   <p:cSld>
     <p:spTree>
       <p:nvGrpSpPr>
@@ -5448,7 +6188,14 @@
         <p:cNvGrpSpPr/>
         <p:nvPr/>
       </p:nvGrpSpPr>
-      <p:grpSpPr/>
+      <p:grpSpPr>
+        <a:xfrm>
+          <a:off x="0" y="0"/>
+          <a:ext cx="0" cy="0"/>
+          <a:chOff x="0" y="0"/>
+          <a:chExt cx="0" cy="0"/>
+        </a:xfrm>
+      </p:grpSpPr>
       <p:sp>
         <p:nvSpPr>
           <p:cNvPr id="2" name="Title 1"/>
@@ -5484,7 +6231,9 @@
         <p:txBody>
           <a:bodyPr wrap="square"/>
           <a:lstStyle/>
-          <a:p/>
+          <a:p>
+            <a:endParaRPr/>
+          </a:p>
           <a:p>
             <a:pPr>
               <a:spcAft>
@@ -5579,7 +6328,7 @@
 </file>
 
 <file path=ppt/slides/slide29.xml><?xml version="1.0" encoding="utf-8"?>
-<p:sld xmlns:a="http://schemas.openxmlformats.org/drawingml/2006/main" xmlns:p="http://schemas.openxmlformats.org/presentationml/2006/main" xmlns:r="http://schemas.openxmlformats.org/officeDocument/2006/relationships">
+<p:sld xmlns:a="http://schemas.openxmlformats.org/drawingml/2006/main" xmlns:r="http://schemas.openxmlformats.org/officeDocument/2006/relationships" xmlns:p="http://schemas.openxmlformats.org/presentationml/2006/main">
   <p:cSld>
     <p:spTree>
       <p:nvGrpSpPr>
@@ -5587,7 +6336,14 @@
         <p:cNvGrpSpPr/>
         <p:nvPr/>
       </p:nvGrpSpPr>
-      <p:grpSpPr/>
+      <p:grpSpPr>
+        <a:xfrm>
+          <a:off x="0" y="0"/>
+          <a:ext cx="0" cy="0"/>
+          <a:chOff x="0" y="0"/>
+          <a:chExt cx="0" cy="0"/>
+        </a:xfrm>
+      </p:grpSpPr>
       <p:sp>
         <p:nvSpPr>
           <p:cNvPr id="2" name="Title 1"/>
@@ -5623,7 +6379,9 @@
         <p:txBody>
           <a:bodyPr wrap="square"/>
           <a:lstStyle/>
-          <a:p/>
+          <a:p>
+            <a:endParaRPr/>
+          </a:p>
           <a:p>
             <a:pPr>
               <a:spcAft>
@@ -5708,7 +6466,7 @@
 </file>
 
 <file path=ppt/slides/slide3.xml><?xml version="1.0" encoding="utf-8"?>
-<p:sld xmlns:a="http://schemas.openxmlformats.org/drawingml/2006/main" xmlns:p="http://schemas.openxmlformats.org/presentationml/2006/main" xmlns:r="http://schemas.openxmlformats.org/officeDocument/2006/relationships">
+<p:sld xmlns:a="http://schemas.openxmlformats.org/drawingml/2006/main" xmlns:r="http://schemas.openxmlformats.org/officeDocument/2006/relationships" xmlns:p="http://schemas.openxmlformats.org/presentationml/2006/main">
   <p:cSld>
     <p:spTree>
       <p:nvGrpSpPr>
@@ -5716,7 +6474,14 @@
         <p:cNvGrpSpPr/>
         <p:nvPr/>
       </p:nvGrpSpPr>
-      <p:grpSpPr/>
+      <p:grpSpPr>
+        <a:xfrm>
+          <a:off x="0" y="0"/>
+          <a:ext cx="0" cy="0"/>
+          <a:chOff x="0" y="0"/>
+          <a:chExt cx="0" cy="0"/>
+        </a:xfrm>
+      </p:grpSpPr>
       <p:sp>
         <p:nvSpPr>
           <p:cNvPr id="2" name="Title 1"/>
@@ -5752,7 +6517,9 @@
         <p:txBody>
           <a:bodyPr wrap="square"/>
           <a:lstStyle/>
-          <a:p/>
+          <a:p>
+            <a:endParaRPr/>
+          </a:p>
           <a:p>
             <a:pPr>
               <a:spcAft>
@@ -5807,7 +6574,7 @@
 </file>
 
 <file path=ppt/slides/slide30.xml><?xml version="1.0" encoding="utf-8"?>
-<p:sld xmlns:a="http://schemas.openxmlformats.org/drawingml/2006/main" xmlns:p="http://schemas.openxmlformats.org/presentationml/2006/main" xmlns:r="http://schemas.openxmlformats.org/officeDocument/2006/relationships">
+<p:sld xmlns:a="http://schemas.openxmlformats.org/drawingml/2006/main" xmlns:r="http://schemas.openxmlformats.org/officeDocument/2006/relationships" xmlns:p="http://schemas.openxmlformats.org/presentationml/2006/main">
   <p:cSld>
     <p:spTree>
       <p:nvGrpSpPr>
@@ -5815,7 +6582,14 @@
         <p:cNvGrpSpPr/>
         <p:nvPr/>
       </p:nvGrpSpPr>
-      <p:grpSpPr/>
+      <p:grpSpPr>
+        <a:xfrm>
+          <a:off x="0" y="0"/>
+          <a:ext cx="0" cy="0"/>
+          <a:chOff x="0" y="0"/>
+          <a:chExt cx="0" cy="0"/>
+        </a:xfrm>
+      </p:grpSpPr>
       <p:sp>
         <p:nvSpPr>
           <p:cNvPr id="2" name="Title 1"/>
@@ -5851,7 +6625,9 @@
         <p:txBody>
           <a:bodyPr wrap="square"/>
           <a:lstStyle/>
-          <a:p/>
+          <a:p>
+            <a:endParaRPr/>
+          </a:p>
           <a:p>
             <a:pPr>
               <a:spcAft>
@@ -5924,7 +6700,7 @@
 </file>
 
 <file path=ppt/slides/slide31.xml><?xml version="1.0" encoding="utf-8"?>
-<p:sld xmlns:a="http://schemas.openxmlformats.org/drawingml/2006/main" xmlns:p="http://schemas.openxmlformats.org/presentationml/2006/main" xmlns:r="http://schemas.openxmlformats.org/officeDocument/2006/relationships">
+<p:sld xmlns:a="http://schemas.openxmlformats.org/drawingml/2006/main" xmlns:r="http://schemas.openxmlformats.org/officeDocument/2006/relationships" xmlns:p="http://schemas.openxmlformats.org/presentationml/2006/main">
   <p:cSld>
     <p:spTree>
       <p:nvGrpSpPr>
@@ -5932,7 +6708,14 @@
         <p:cNvGrpSpPr/>
         <p:nvPr/>
       </p:nvGrpSpPr>
-      <p:grpSpPr/>
+      <p:grpSpPr>
+        <a:xfrm>
+          <a:off x="0" y="0"/>
+          <a:ext cx="0" cy="0"/>
+          <a:chOff x="0" y="0"/>
+          <a:chExt cx="0" cy="0"/>
+        </a:xfrm>
+      </p:grpSpPr>
       <p:sp>
         <p:nvSpPr>
           <p:cNvPr id="2" name="Title 1"/>
@@ -5968,7 +6751,9 @@
         <p:txBody>
           <a:bodyPr wrap="square"/>
           <a:lstStyle/>
-          <a:p/>
+          <a:p>
+            <a:endParaRPr/>
+          </a:p>
           <a:p>
             <a:pPr>
               <a:spcAft>
@@ -6006,7 +6791,7 @@
 </file>
 
 <file path=ppt/slides/slide32.xml><?xml version="1.0" encoding="utf-8"?>
-<p:sld xmlns:a="http://schemas.openxmlformats.org/drawingml/2006/main" xmlns:p="http://schemas.openxmlformats.org/presentationml/2006/main" xmlns:r="http://schemas.openxmlformats.org/officeDocument/2006/relationships">
+<p:sld xmlns:a="http://schemas.openxmlformats.org/drawingml/2006/main" xmlns:r="http://schemas.openxmlformats.org/officeDocument/2006/relationships" xmlns:p="http://schemas.openxmlformats.org/presentationml/2006/main">
   <p:cSld>
     <p:spTree>
       <p:nvGrpSpPr>
@@ -6014,7 +6799,14 @@
         <p:cNvGrpSpPr/>
         <p:nvPr/>
       </p:nvGrpSpPr>
-      <p:grpSpPr/>
+      <p:grpSpPr>
+        <a:xfrm>
+          <a:off x="0" y="0"/>
+          <a:ext cx="0" cy="0"/>
+          <a:chOff x="0" y="0"/>
+          <a:chExt cx="0" cy="0"/>
+        </a:xfrm>
+      </p:grpSpPr>
       <p:sp>
         <p:nvSpPr>
           <p:cNvPr id="2" name="Title 1"/>
@@ -6050,7 +6842,9 @@
         <p:txBody>
           <a:bodyPr wrap="square"/>
           <a:lstStyle/>
-          <a:p/>
+          <a:p>
+            <a:endParaRPr/>
+          </a:p>
           <a:p>
             <a:pPr>
               <a:spcAft>
@@ -6162,7 +6956,7 @@
 </file>
 
 <file path=ppt/slides/slide4.xml><?xml version="1.0" encoding="utf-8"?>
-<p:sld xmlns:a="http://schemas.openxmlformats.org/drawingml/2006/main" xmlns:p="http://schemas.openxmlformats.org/presentationml/2006/main" xmlns:r="http://schemas.openxmlformats.org/officeDocument/2006/relationships">
+<p:sld xmlns:a="http://schemas.openxmlformats.org/drawingml/2006/main" xmlns:r="http://schemas.openxmlformats.org/officeDocument/2006/relationships" xmlns:p="http://schemas.openxmlformats.org/presentationml/2006/main">
   <p:cSld>
     <p:spTree>
       <p:nvGrpSpPr>
@@ -6170,7 +6964,14 @@
         <p:cNvGrpSpPr/>
         <p:nvPr/>
       </p:nvGrpSpPr>
-      <p:grpSpPr/>
+      <p:grpSpPr>
+        <a:xfrm>
+          <a:off x="0" y="0"/>
+          <a:ext cx="0" cy="0"/>
+          <a:chOff x="0" y="0"/>
+          <a:chExt cx="0" cy="0"/>
+        </a:xfrm>
+      </p:grpSpPr>
       <p:sp>
         <p:nvSpPr>
           <p:cNvPr id="2" name="Title 1"/>
@@ -6206,7 +7007,9 @@
         <p:txBody>
           <a:bodyPr wrap="square"/>
           <a:lstStyle/>
-          <a:p/>
+          <a:p>
+            <a:endParaRPr/>
+          </a:p>
           <a:p>
             <a:pPr>
               <a:spcAft>
@@ -6296,7 +7099,7 @@
 </file>
 
 <file path=ppt/slides/slide5.xml><?xml version="1.0" encoding="utf-8"?>
-<p:sld xmlns:a="http://schemas.openxmlformats.org/drawingml/2006/main" xmlns:p="http://schemas.openxmlformats.org/presentationml/2006/main" xmlns:r="http://schemas.openxmlformats.org/officeDocument/2006/relationships">
+<p:sld xmlns:a="http://schemas.openxmlformats.org/drawingml/2006/main" xmlns:r="http://schemas.openxmlformats.org/officeDocument/2006/relationships" xmlns:p="http://schemas.openxmlformats.org/presentationml/2006/main">
   <p:cSld>
     <p:spTree>
       <p:nvGrpSpPr>
@@ -6304,7 +7107,14 @@
         <p:cNvGrpSpPr/>
         <p:nvPr/>
       </p:nvGrpSpPr>
-      <p:grpSpPr/>
+      <p:grpSpPr>
+        <a:xfrm>
+          <a:off x="0" y="0"/>
+          <a:ext cx="0" cy="0"/>
+          <a:chOff x="0" y="0"/>
+          <a:chExt cx="0" cy="0"/>
+        </a:xfrm>
+      </p:grpSpPr>
       <p:sp>
         <p:nvSpPr>
           <p:cNvPr id="2" name="Title 1"/>
@@ -6340,7 +7150,9 @@
         <p:txBody>
           <a:bodyPr wrap="square"/>
           <a:lstStyle/>
-          <a:p/>
+          <a:p>
+            <a:endParaRPr/>
+          </a:p>
           <a:p>
             <a:pPr>
               <a:spcAft>
@@ -6363,7 +7175,7 @@
 </file>
 
 <file path=ppt/slides/slide6.xml><?xml version="1.0" encoding="utf-8"?>
-<p:sld xmlns:a="http://schemas.openxmlformats.org/drawingml/2006/main" xmlns:p="http://schemas.openxmlformats.org/presentationml/2006/main" xmlns:r="http://schemas.openxmlformats.org/officeDocument/2006/relationships">
+<p:sld xmlns:a="http://schemas.openxmlformats.org/drawingml/2006/main" xmlns:r="http://schemas.openxmlformats.org/officeDocument/2006/relationships" xmlns:p="http://schemas.openxmlformats.org/presentationml/2006/main">
   <p:cSld>
     <p:spTree>
       <p:nvGrpSpPr>
@@ -6371,7 +7183,14 @@
         <p:cNvGrpSpPr/>
         <p:nvPr/>
       </p:nvGrpSpPr>
-      <p:grpSpPr/>
+      <p:grpSpPr>
+        <a:xfrm>
+          <a:off x="0" y="0"/>
+          <a:ext cx="0" cy="0"/>
+          <a:chOff x="0" y="0"/>
+          <a:chExt cx="0" cy="0"/>
+        </a:xfrm>
+      </p:grpSpPr>
       <p:sp>
         <p:nvSpPr>
           <p:cNvPr id="2" name="Title 1"/>
@@ -6407,7 +7226,9 @@
         <p:txBody>
           <a:bodyPr wrap="square"/>
           <a:lstStyle/>
-          <a:p/>
+          <a:p>
+            <a:endParaRPr/>
+          </a:p>
           <a:p>
             <a:pPr>
               <a:spcAft>
@@ -6482,7 +7303,7 @@
 </file>
 
 <file path=ppt/slides/slide7.xml><?xml version="1.0" encoding="utf-8"?>
-<p:sld xmlns:a="http://schemas.openxmlformats.org/drawingml/2006/main" xmlns:p="http://schemas.openxmlformats.org/presentationml/2006/main" xmlns:r="http://schemas.openxmlformats.org/officeDocument/2006/relationships">
+<p:sld xmlns:a="http://schemas.openxmlformats.org/drawingml/2006/main" xmlns:r="http://schemas.openxmlformats.org/officeDocument/2006/relationships" xmlns:p="http://schemas.openxmlformats.org/presentationml/2006/main">
   <p:cSld>
     <p:spTree>
       <p:nvGrpSpPr>
@@ -6490,7 +7311,14 @@
         <p:cNvGrpSpPr/>
         <p:nvPr/>
       </p:nvGrpSpPr>
-      <p:grpSpPr/>
+      <p:grpSpPr>
+        <a:xfrm>
+          <a:off x="0" y="0"/>
+          <a:ext cx="0" cy="0"/>
+          <a:chOff x="0" y="0"/>
+          <a:chExt cx="0" cy="0"/>
+        </a:xfrm>
+      </p:grpSpPr>
       <p:sp>
         <p:nvSpPr>
           <p:cNvPr id="2" name="Title 1"/>
@@ -6526,7 +7354,9 @@
         <p:txBody>
           <a:bodyPr wrap="square"/>
           <a:lstStyle/>
-          <a:p/>
+          <a:p>
+            <a:endParaRPr/>
+          </a:p>
           <a:p>
             <a:pPr>
               <a:spcAft>
@@ -6549,7 +7379,7 @@
 </file>
 
 <file path=ppt/slides/slide8.xml><?xml version="1.0" encoding="utf-8"?>
-<p:sld xmlns:a="http://schemas.openxmlformats.org/drawingml/2006/main" xmlns:p="http://schemas.openxmlformats.org/presentationml/2006/main" xmlns:r="http://schemas.openxmlformats.org/officeDocument/2006/relationships">
+<p:sld xmlns:a="http://schemas.openxmlformats.org/drawingml/2006/main" xmlns:r="http://schemas.openxmlformats.org/officeDocument/2006/relationships" xmlns:p="http://schemas.openxmlformats.org/presentationml/2006/main">
   <p:cSld>
     <p:spTree>
       <p:nvGrpSpPr>
@@ -6557,7 +7387,14 @@
         <p:cNvGrpSpPr/>
         <p:nvPr/>
       </p:nvGrpSpPr>
-      <p:grpSpPr/>
+      <p:grpSpPr>
+        <a:xfrm>
+          <a:off x="0" y="0"/>
+          <a:ext cx="0" cy="0"/>
+          <a:chOff x="0" y="0"/>
+          <a:chExt cx="0" cy="0"/>
+        </a:xfrm>
+      </p:grpSpPr>
       <p:sp>
         <p:nvSpPr>
           <p:cNvPr id="2" name="Title 1"/>
@@ -6593,7 +7430,9 @@
         <p:txBody>
           <a:bodyPr wrap="square"/>
           <a:lstStyle/>
-          <a:p/>
+          <a:p>
+            <a:endParaRPr/>
+          </a:p>
           <a:p>
             <a:pPr>
               <a:spcAft>
@@ -6689,7 +7528,7 @@
 </file>
 
 <file path=ppt/slides/slide9.xml><?xml version="1.0" encoding="utf-8"?>
-<p:sld xmlns:a="http://schemas.openxmlformats.org/drawingml/2006/main" xmlns:p="http://schemas.openxmlformats.org/presentationml/2006/main" xmlns:r="http://schemas.openxmlformats.org/officeDocument/2006/relationships">
+<p:sld xmlns:a="http://schemas.openxmlformats.org/drawingml/2006/main" xmlns:r="http://schemas.openxmlformats.org/officeDocument/2006/relationships" xmlns:p="http://schemas.openxmlformats.org/presentationml/2006/main">
   <p:cSld>
     <p:spTree>
       <p:nvGrpSpPr>
@@ -6697,7 +7536,14 @@
         <p:cNvGrpSpPr/>
         <p:nvPr/>
       </p:nvGrpSpPr>
-      <p:grpSpPr/>
+      <p:grpSpPr>
+        <a:xfrm>
+          <a:off x="0" y="0"/>
+          <a:ext cx="0" cy="0"/>
+          <a:chOff x="0" y="0"/>
+          <a:chExt cx="0" cy="0"/>
+        </a:xfrm>
+      </p:grpSpPr>
       <p:sp>
         <p:nvSpPr>
           <p:cNvPr id="2" name="Title 1"/>
@@ -6733,7 +7579,9 @@
         <p:txBody>
           <a:bodyPr wrap="square"/>
           <a:lstStyle/>
-          <a:p/>
+          <a:p>
+            <a:endParaRPr/>
+          </a:p>
           <a:p>
             <a:pPr>
               <a:spcAft>

</xml_diff>